<commit_message>
quelques modifs sur le diapo
</commit_message>
<xml_diff>
--- a/PointMiParcours.pptx
+++ b/PointMiParcours.pptx
@@ -2,14 +2,19 @@
 <file path=ppt/presentation.xml><?xml version="1.0" encoding="utf-8"?>
 <p:presentation xmlns:a="http://schemas.openxmlformats.org/drawingml/2006/main" xmlns:r="http://schemas.openxmlformats.org/officeDocument/2006/relationships" xmlns:p="http://schemas.openxmlformats.org/presentationml/2006/main" autoCompressPictures="0">
   <p:sldMasterIdLst>
-    <p:sldMasterId id="2147483852" r:id="rId1"/>
+    <p:sldMasterId id="2147483876" r:id="rId2"/>
   </p:sldMasterIdLst>
   <p:sldIdLst>
-    <p:sldId id="256" r:id="rId2"/>
-    <p:sldId id="258" r:id="rId3"/>
-    <p:sldId id="257" r:id="rId4"/>
+    <p:sldId id="256" r:id="rId3"/>
+    <p:sldId id="258" r:id="rId4"/>
     <p:sldId id="259" r:id="rId5"/>
     <p:sldId id="260" r:id="rId6"/>
+    <p:sldId id="261" r:id="rId7"/>
+    <p:sldId id="262" r:id="rId8"/>
+    <p:sldId id="263" r:id="rId9"/>
+    <p:sldId id="264" r:id="rId10"/>
+    <p:sldId id="265" r:id="rId11"/>
+    <p:sldId id="266" r:id="rId12"/>
   </p:sldIdLst>
   <p:sldSz cx="12192000" cy="6858000"/>
   <p:notesSz cx="6858000" cy="9144000"/>
@@ -284,7 +289,7 @@
           <a:p>
             <a:fld id="{9E016143-E03C-4CFD-AFDC-14E5BDEA754C}" type="datetimeFigureOut">
               <a:rPr lang="en-US" smtClean="0"/>
-              <a:t>1/16/2019</a:t>
+              <a:t>1/17/2019</a:t>
             </a:fld>
             <a:endParaRPr lang="en-US" dirty="0"/>
           </a:p>
@@ -394,7 +399,7 @@
     </p:spTree>
     <p:extLst>
       <p:ext uri="{BB962C8B-B14F-4D97-AF65-F5344CB8AC3E}">
-        <p14:creationId xmlns:p14="http://schemas.microsoft.com/office/powerpoint/2010/main" val="3778583825"/>
+        <p14:creationId xmlns:p14="http://schemas.microsoft.com/office/powerpoint/2010/main" val="1782978373"/>
       </p:ext>
     </p:extLst>
   </p:cSld>
@@ -513,7 +518,7 @@
           <a:p>
             <a:fld id="{C033E54A-A8CA-48C1-9504-691B58049D29}" type="datetimeFigureOut">
               <a:rPr lang="en-US" smtClean="0"/>
-              <a:t>1/16/2019</a:t>
+              <a:t>1/17/2019</a:t>
             </a:fld>
             <a:endParaRPr lang="en-US" dirty="0"/>
           </a:p>
@@ -564,7 +569,7 @@
     </p:spTree>
     <p:extLst>
       <p:ext uri="{BB962C8B-B14F-4D97-AF65-F5344CB8AC3E}">
-        <p14:creationId xmlns:p14="http://schemas.microsoft.com/office/powerpoint/2010/main" val="979838495"/>
+        <p14:creationId xmlns:p14="http://schemas.microsoft.com/office/powerpoint/2010/main" val="64078894"/>
       </p:ext>
     </p:extLst>
   </p:cSld>
@@ -693,7 +698,7 @@
           <a:p>
             <a:fld id="{B5F6C806-BBF7-471C-9527-881CE2266695}" type="datetimeFigureOut">
               <a:rPr lang="en-US" smtClean="0"/>
-              <a:t>1/16/2019</a:t>
+              <a:t>1/17/2019</a:t>
             </a:fld>
             <a:endParaRPr lang="en-US" dirty="0"/>
           </a:p>
@@ -744,7 +749,7 @@
     </p:spTree>
     <p:extLst>
       <p:ext uri="{BB962C8B-B14F-4D97-AF65-F5344CB8AC3E}">
-        <p14:creationId xmlns:p14="http://schemas.microsoft.com/office/powerpoint/2010/main" val="2087352866"/>
+        <p14:creationId xmlns:p14="http://schemas.microsoft.com/office/powerpoint/2010/main" val="367173618"/>
       </p:ext>
     </p:extLst>
   </p:cSld>
@@ -863,7 +868,7 @@
           <a:p>
             <a:fld id="{78C94063-DF36-4330-A365-08DA1FA5B7D6}" type="datetimeFigureOut">
               <a:rPr lang="en-US" smtClean="0"/>
-              <a:t>1/16/2019</a:t>
+              <a:t>1/17/2019</a:t>
             </a:fld>
             <a:endParaRPr lang="en-US" dirty="0"/>
           </a:p>
@@ -914,7 +919,7 @@
     </p:spTree>
     <p:extLst>
       <p:ext uri="{BB962C8B-B14F-4D97-AF65-F5344CB8AC3E}">
-        <p14:creationId xmlns:p14="http://schemas.microsoft.com/office/powerpoint/2010/main" val="2964208738"/>
+        <p14:creationId xmlns:p14="http://schemas.microsoft.com/office/powerpoint/2010/main" val="3302770680"/>
       </p:ext>
     </p:extLst>
   </p:cSld>
@@ -1117,7 +1122,7 @@
           <a:p>
             <a:fld id="{908A7C6C-0F39-4D70-8E8D-FE5B9C95FA73}" type="datetimeFigureOut">
               <a:rPr lang="en-US" smtClean="0"/>
-              <a:t>1/16/2019</a:t>
+              <a:t>1/17/2019</a:t>
             </a:fld>
             <a:endParaRPr lang="en-US" dirty="0"/>
           </a:p>
@@ -1206,7 +1211,7 @@
     </p:spTree>
     <p:extLst>
       <p:ext uri="{BB962C8B-B14F-4D97-AF65-F5344CB8AC3E}">
-        <p14:creationId xmlns:p14="http://schemas.microsoft.com/office/powerpoint/2010/main" val="2494398727"/>
+        <p14:creationId xmlns:p14="http://schemas.microsoft.com/office/powerpoint/2010/main" val="705172107"/>
       </p:ext>
     </p:extLst>
   </p:cSld>
@@ -1443,7 +1448,7 @@
           <a:p>
             <a:fld id="{DFCFA4AC-08CC-42CE-BD01-C191750A04EC}" type="datetimeFigureOut">
               <a:rPr lang="en-US" smtClean="0"/>
-              <a:t>1/16/2019</a:t>
+              <a:t>1/17/2019</a:t>
             </a:fld>
             <a:endParaRPr lang="en-US" dirty="0"/>
           </a:p>
@@ -1494,7 +1499,7 @@
     </p:spTree>
     <p:extLst>
       <p:ext uri="{BB962C8B-B14F-4D97-AF65-F5344CB8AC3E}">
-        <p14:creationId xmlns:p14="http://schemas.microsoft.com/office/powerpoint/2010/main" val="731778711"/>
+        <p14:creationId xmlns:p14="http://schemas.microsoft.com/office/powerpoint/2010/main" val="1844796042"/>
       </p:ext>
     </p:extLst>
   </p:cSld>
@@ -1894,7 +1899,7 @@
           <a:p>
             <a:fld id="{1BA7A723-92A7-435B-B681-F25B092FEFEB}" type="datetimeFigureOut">
               <a:rPr lang="en-US" smtClean="0"/>
-              <a:t>1/16/2019</a:t>
+              <a:t>1/17/2019</a:t>
             </a:fld>
             <a:endParaRPr lang="en-US" dirty="0"/>
           </a:p>
@@ -1945,7 +1950,7 @@
     </p:spTree>
     <p:extLst>
       <p:ext uri="{BB962C8B-B14F-4D97-AF65-F5344CB8AC3E}">
-        <p14:creationId xmlns:p14="http://schemas.microsoft.com/office/powerpoint/2010/main" val="3257308815"/>
+        <p14:creationId xmlns:p14="http://schemas.microsoft.com/office/powerpoint/2010/main" val="1822962329"/>
       </p:ext>
     </p:extLst>
   </p:cSld>
@@ -2012,7 +2017,7 @@
           <a:p>
             <a:fld id="{4F170639-886C-4FCF-9EAB-ABB5DA3F3F4A}" type="datetimeFigureOut">
               <a:rPr lang="en-US" smtClean="0"/>
-              <a:t>1/16/2019</a:t>
+              <a:t>1/17/2019</a:t>
             </a:fld>
             <a:endParaRPr lang="en-US" dirty="0"/>
           </a:p>
@@ -2063,7 +2068,7 @@
     </p:spTree>
     <p:extLst>
       <p:ext uri="{BB962C8B-B14F-4D97-AF65-F5344CB8AC3E}">
-        <p14:creationId xmlns:p14="http://schemas.microsoft.com/office/powerpoint/2010/main" val="2719460584"/>
+        <p14:creationId xmlns:p14="http://schemas.microsoft.com/office/powerpoint/2010/main" val="2910520375"/>
       </p:ext>
     </p:extLst>
   </p:cSld>
@@ -2107,7 +2112,7 @@
           <a:p>
             <a:fld id="{22230651-31F4-45D2-98AE-A2108F41BC07}" type="datetimeFigureOut">
               <a:rPr lang="en-US" smtClean="0"/>
-              <a:t>1/16/2019</a:t>
+              <a:t>1/17/2019</a:t>
             </a:fld>
             <a:endParaRPr lang="en-US" dirty="0"/>
           </a:p>
@@ -2158,7 +2163,7 @@
     </p:spTree>
     <p:extLst>
       <p:ext uri="{BB962C8B-B14F-4D97-AF65-F5344CB8AC3E}">
-        <p14:creationId xmlns:p14="http://schemas.microsoft.com/office/powerpoint/2010/main" val="1239108636"/>
+        <p14:creationId xmlns:p14="http://schemas.microsoft.com/office/powerpoint/2010/main" val="2213142617"/>
       </p:ext>
     </p:extLst>
   </p:cSld>
@@ -2394,7 +2399,7 @@
           <a:p>
             <a:fld id="{6F53789A-C914-4DB1-8815-80B5EC7335C5}" type="datetimeFigureOut">
               <a:rPr lang="en-US" smtClean="0"/>
-              <a:t>1/16/2019</a:t>
+              <a:t>1/17/2019</a:t>
             </a:fld>
             <a:endParaRPr lang="en-US" dirty="0"/>
           </a:p>
@@ -2445,7 +2450,7 @@
     </p:spTree>
     <p:extLst>
       <p:ext uri="{BB962C8B-B14F-4D97-AF65-F5344CB8AC3E}">
-        <p14:creationId xmlns:p14="http://schemas.microsoft.com/office/powerpoint/2010/main" val="3245960452"/>
+        <p14:creationId xmlns:p14="http://schemas.microsoft.com/office/powerpoint/2010/main" val="2218421770"/>
       </p:ext>
     </p:extLst>
   </p:cSld>
@@ -2719,7 +2724,7 @@
           <a:p>
             <a:fld id="{5E6440AA-91A0-436F-8FDB-C0F939DCAE21}" type="datetimeFigureOut">
               <a:rPr lang="en-US" smtClean="0"/>
-              <a:t>1/16/2019</a:t>
+              <a:t>1/17/2019</a:t>
             </a:fld>
             <a:endParaRPr lang="en-US" dirty="0"/>
           </a:p>
@@ -2770,7 +2775,7 @@
     </p:spTree>
     <p:extLst>
       <p:ext uri="{BB962C8B-B14F-4D97-AF65-F5344CB8AC3E}">
-        <p14:creationId xmlns:p14="http://schemas.microsoft.com/office/powerpoint/2010/main" val="3418943621"/>
+        <p14:creationId xmlns:p14="http://schemas.microsoft.com/office/powerpoint/2010/main" val="292494937"/>
       </p:ext>
     </p:extLst>
   </p:cSld>
@@ -2973,7 +2978,7 @@
           <a:p>
             <a:fld id="{0E59FD0C-5451-4CA0-86AF-E70AE3279989}" type="datetimeFigureOut">
               <a:rPr lang="en-US" smtClean="0"/>
-              <a:t>1/16/2019</a:t>
+              <a:t>1/17/2019</a:t>
             </a:fld>
             <a:endParaRPr lang="en-US" dirty="0"/>
           </a:p>
@@ -3065,23 +3070,23 @@
     </p:spTree>
     <p:extLst>
       <p:ext uri="{BB962C8B-B14F-4D97-AF65-F5344CB8AC3E}">
-        <p14:creationId xmlns:p14="http://schemas.microsoft.com/office/powerpoint/2010/main" val="3843320118"/>
+        <p14:creationId xmlns:p14="http://schemas.microsoft.com/office/powerpoint/2010/main" val="749426092"/>
       </p:ext>
     </p:extLst>
   </p:cSld>
   <p:clrMap bg1="lt1" tx1="dk1" bg2="lt2" tx2="dk2" accent1="accent1" accent2="accent2" accent3="accent3" accent4="accent4" accent5="accent5" accent6="accent6" hlink="hlink" folHlink="folHlink"/>
   <p:sldLayoutIdLst>
-    <p:sldLayoutId id="2147483853" r:id="rId1"/>
-    <p:sldLayoutId id="2147483854" r:id="rId2"/>
-    <p:sldLayoutId id="2147483855" r:id="rId3"/>
-    <p:sldLayoutId id="2147483856" r:id="rId4"/>
-    <p:sldLayoutId id="2147483857" r:id="rId5"/>
-    <p:sldLayoutId id="2147483858" r:id="rId6"/>
-    <p:sldLayoutId id="2147483859" r:id="rId7"/>
-    <p:sldLayoutId id="2147483860" r:id="rId8"/>
-    <p:sldLayoutId id="2147483861" r:id="rId9"/>
-    <p:sldLayoutId id="2147483862" r:id="rId10"/>
-    <p:sldLayoutId id="2147483863" r:id="rId11"/>
+    <p:sldLayoutId id="2147483877" r:id="rId1"/>
+    <p:sldLayoutId id="2147483878" r:id="rId2"/>
+    <p:sldLayoutId id="2147483879" r:id="rId3"/>
+    <p:sldLayoutId id="2147483880" r:id="rId4"/>
+    <p:sldLayoutId id="2147483881" r:id="rId5"/>
+    <p:sldLayoutId id="2147483882" r:id="rId6"/>
+    <p:sldLayoutId id="2147483883" r:id="rId7"/>
+    <p:sldLayoutId id="2147483884" r:id="rId8"/>
+    <p:sldLayoutId id="2147483885" r:id="rId9"/>
+    <p:sldLayoutId id="2147483886" r:id="rId10"/>
+    <p:sldLayoutId id="2147483887" r:id="rId11"/>
   </p:sldLayoutIdLst>
   <p:hf sldNum="0" hdr="0" ftr="0" dt="0"/>
   <p:txStyles>
@@ -3449,6 +3454,14 @@
 <file path=ppt/slides/slide1.xml><?xml version="1.0" encoding="utf-8"?>
 <p:sld xmlns:a="http://schemas.openxmlformats.org/drawingml/2006/main" xmlns:r="http://schemas.openxmlformats.org/officeDocument/2006/relationships" xmlns:p="http://schemas.openxmlformats.org/presentationml/2006/main">
   <p:cSld>
+    <p:bg>
+      <p:bgPr>
+        <a:solidFill>
+          <a:schemeClr val="bg2"/>
+        </a:solidFill>
+        <a:effectLst/>
+      </p:bgPr>
+    </p:bg>
     <p:spTree>
       <p:nvGrpSpPr>
         <p:cNvPr id="1" name=""/>
@@ -3481,12 +3494,14 @@
         </p:nvSpPr>
         <p:spPr>
           <a:xfrm>
-            <a:off x="1261872" y="365760"/>
-            <a:ext cx="9418320" cy="4041648"/>
+            <a:off x="5522600" y="758952"/>
+            <a:ext cx="5157591" cy="4041648"/>
           </a:xfrm>
         </p:spPr>
         <p:txBody>
-          <a:bodyPr/>
+          <a:bodyPr>
+            <a:normAutofit/>
+          </a:bodyPr>
           <a:lstStyle/>
           <a:p>
             <a:r>
@@ -3512,38 +3527,153 @@
             <p:ph type="subTitle" idx="1"/>
           </p:nvPr>
         </p:nvSpPr>
-        <p:spPr/>
+        <p:spPr>
+          <a:xfrm>
+            <a:off x="5522600" y="4800600"/>
+            <a:ext cx="5157592" cy="1691640"/>
+          </a:xfrm>
+        </p:spPr>
         <p:txBody>
           <a:bodyPr>
-            <a:normAutofit fontScale="92500" lnSpcReduction="20000"/>
+            <a:normAutofit/>
           </a:bodyPr>
           <a:lstStyle/>
           <a:p>
             <a:r>
-              <a:rPr lang="fr-FR" dirty="0"/>
+              <a:rPr lang="fr-FR" sz="1700">
+                <a:solidFill>
+                  <a:schemeClr val="tx1">
+                    <a:lumMod val="85000"/>
+                  </a:schemeClr>
+                </a:solidFill>
+              </a:rPr>
               <a:t>Florentin DEHOOGHE</a:t>
             </a:r>
           </a:p>
           <a:p>
             <a:r>
-              <a:rPr lang="fr-FR" dirty="0"/>
+              <a:rPr lang="fr-FR" sz="1700">
+                <a:solidFill>
+                  <a:schemeClr val="tx1">
+                    <a:lumMod val="85000"/>
+                  </a:schemeClr>
+                </a:solidFill>
+              </a:rPr>
               <a:t>Louis-Clément LANGUE</a:t>
             </a:r>
           </a:p>
           <a:p>
             <a:r>
-              <a:rPr lang="fr-FR" dirty="0"/>
+              <a:rPr lang="fr-FR" sz="1700">
+                <a:solidFill>
+                  <a:schemeClr val="tx1">
+                    <a:lumMod val="85000"/>
+                  </a:schemeClr>
+                </a:solidFill>
+              </a:rPr>
               <a:t>Rémi VANDEWALLE</a:t>
             </a:r>
           </a:p>
           <a:p>
             <a:r>
-              <a:rPr lang="fr-FR" dirty="0"/>
+              <a:rPr lang="fr-FR" sz="1700">
+                <a:solidFill>
+                  <a:schemeClr val="tx1">
+                    <a:lumMod val="85000"/>
+                  </a:schemeClr>
+                </a:solidFill>
+              </a:rPr>
               <a:t>Louis VIVIER</a:t>
             </a:r>
           </a:p>
         </p:txBody>
       </p:sp>
+      <p:pic>
+        <p:nvPicPr>
+          <p:cNvPr id="7" name="Graphic 6">
+            <a:extLst>
+              <a:ext uri="{FF2B5EF4-FFF2-40B4-BE49-F238E27FC236}">
+                <a16:creationId xmlns:a16="http://schemas.microsoft.com/office/drawing/2014/main" id="{509200F1-A08F-4552-8531-FCFFE1AA630D}"/>
+              </a:ext>
+            </a:extLst>
+          </p:cNvPr>
+          <p:cNvPicPr>
+            <a:picLocks noChangeAspect="1"/>
+          </p:cNvPicPr>
+          <p:nvPr/>
+        </p:nvPicPr>
+        <p:blipFill>
+          <a:blip r:embed="rId2">
+            <a:extLst>
+              <a:ext uri="{28A0092B-C50C-407E-A947-70E740481C1C}">
+                <a14:useLocalDpi xmlns:a14="http://schemas.microsoft.com/office/drawing/2010/main" val="0"/>
+              </a:ext>
+              <a:ext uri="{96DAC541-7B7A-43D3-8B79-37D633B846F1}">
+                <asvg:svgBlip xmlns:asvg="http://schemas.microsoft.com/office/drawing/2016/SVG/main" r:embed="rId3"/>
+              </a:ext>
+            </a:extLst>
+          </a:blip>
+          <a:stretch>
+            <a:fillRect/>
+          </a:stretch>
+        </p:blipFill>
+        <p:spPr>
+          <a:xfrm>
+            <a:off x="916751" y="1565169"/>
+            <a:ext cx="3718563" cy="3718563"/>
+          </a:xfrm>
+          <a:prstGeom prst="rect">
+            <a:avLst/>
+          </a:prstGeom>
+        </p:spPr>
+      </p:pic>
+      <p:pic>
+        <p:nvPicPr>
+          <p:cNvPr id="1026" name="Picture 2" descr="GeniusGames">
+            <a:extLst>
+              <a:ext uri="{FF2B5EF4-FFF2-40B4-BE49-F238E27FC236}">
+                <a16:creationId xmlns:a16="http://schemas.microsoft.com/office/drawing/2014/main" id="{F24CC5FE-847A-4BF4-8F81-B0024D246A72}"/>
+              </a:ext>
+            </a:extLst>
+          </p:cNvPr>
+          <p:cNvPicPr>
+            <a:picLocks noChangeAspect="1" noChangeArrowheads="1"/>
+          </p:cNvPicPr>
+          <p:nvPr/>
+        </p:nvPicPr>
+        <p:blipFill>
+          <a:blip r:embed="rId4">
+            <a:extLst>
+              <a:ext uri="{28A0092B-C50C-407E-A947-70E740481C1C}">
+                <a14:useLocalDpi xmlns:a14="http://schemas.microsoft.com/office/drawing/2010/main" val="0"/>
+              </a:ext>
+            </a:extLst>
+          </a:blip>
+          <a:srcRect/>
+          <a:stretch>
+            <a:fillRect/>
+          </a:stretch>
+        </p:blipFill>
+        <p:spPr bwMode="auto">
+          <a:xfrm>
+            <a:off x="8901495" y="200024"/>
+            <a:ext cx="2486025" cy="2486025"/>
+          </a:xfrm>
+          <a:prstGeom prst="rect">
+            <a:avLst/>
+          </a:prstGeom>
+          <a:noFill/>
+          <a:extLst>
+            <a:ext uri="{909E8E84-426E-40DD-AFC4-6F175D3DCCD1}">
+              <a14:hiddenFill xmlns:a14="http://schemas.microsoft.com/office/drawing/2010/main">
+                <a:solidFill>
+                  <a:srgbClr val="FFFFFF"/>
+                </a:solidFill>
+              </a14:hiddenFill>
+            </a:ext>
+          </a:extLst>
+        </p:spPr>
+      </p:pic>
     </p:spTree>
     <p:extLst>
       <p:ext uri="{BB962C8B-B14F-4D97-AF65-F5344CB8AC3E}">
@@ -3569,6 +3699,101 @@
 </p:sld>
 </file>
 
+<file path=ppt/slides/slide10.xml><?xml version="1.0" encoding="utf-8"?>
+<p:sld xmlns:a="http://schemas.openxmlformats.org/drawingml/2006/main" xmlns:r="http://schemas.openxmlformats.org/officeDocument/2006/relationships" xmlns:p="http://schemas.openxmlformats.org/presentationml/2006/main">
+  <p:cSld>
+    <p:spTree>
+      <p:nvGrpSpPr>
+        <p:cNvPr id="1" name=""/>
+        <p:cNvGrpSpPr/>
+        <p:nvPr/>
+      </p:nvGrpSpPr>
+      <p:grpSpPr>
+        <a:xfrm>
+          <a:off x="0" y="0"/>
+          <a:ext cx="0" cy="0"/>
+          <a:chOff x="0" y="0"/>
+          <a:chExt cx="0" cy="0"/>
+        </a:xfrm>
+      </p:grpSpPr>
+      <p:sp>
+        <p:nvSpPr>
+          <p:cNvPr id="2" name="Titre 1">
+            <a:extLst>
+              <a:ext uri="{FF2B5EF4-FFF2-40B4-BE49-F238E27FC236}">
+                <a16:creationId xmlns:a16="http://schemas.microsoft.com/office/drawing/2014/main" id="{C3896048-24EA-415C-80D7-6D3F68E4EFD5}"/>
+              </a:ext>
+            </a:extLst>
+          </p:cNvPr>
+          <p:cNvSpPr>
+            <a:spLocks noGrp="1"/>
+          </p:cNvSpPr>
+          <p:nvPr>
+            <p:ph type="title"/>
+          </p:nvPr>
+        </p:nvSpPr>
+        <p:spPr/>
+        <p:txBody>
+          <a:bodyPr/>
+          <a:lstStyle/>
+          <a:p>
+            <a:r>
+              <a:rPr lang="fr-FR" dirty="0"/>
+              <a:t>Les problèmes rencontrés</a:t>
+            </a:r>
+          </a:p>
+        </p:txBody>
+      </p:sp>
+      <p:sp>
+        <p:nvSpPr>
+          <p:cNvPr id="3" name="Espace réservé du contenu 2">
+            <a:extLst>
+              <a:ext uri="{FF2B5EF4-FFF2-40B4-BE49-F238E27FC236}">
+                <a16:creationId xmlns:a16="http://schemas.microsoft.com/office/drawing/2014/main" id="{3D7B68F9-07DE-4B92-91F6-C16174F9DAD7}"/>
+              </a:ext>
+            </a:extLst>
+          </p:cNvPr>
+          <p:cNvSpPr>
+            <a:spLocks noGrp="1"/>
+          </p:cNvSpPr>
+          <p:nvPr>
+            <p:ph idx="1"/>
+          </p:nvPr>
+        </p:nvSpPr>
+        <p:spPr/>
+        <p:txBody>
+          <a:bodyPr/>
+          <a:lstStyle/>
+          <a:p>
+            <a:r>
+              <a:rPr lang="fr-FR" dirty="0"/>
+              <a:t>Accès aux API de la MEL et de transports</a:t>
+            </a:r>
+          </a:p>
+          <a:p>
+            <a:r>
+              <a:rPr lang="fr-FR" dirty="0"/>
+              <a:t>Client archi relou</a:t>
+            </a:r>
+          </a:p>
+          <a:p>
+            <a:endParaRPr lang="fr-FR"/>
+          </a:p>
+        </p:txBody>
+      </p:sp>
+    </p:spTree>
+    <p:extLst>
+      <p:ext uri="{BB962C8B-B14F-4D97-AF65-F5344CB8AC3E}">
+        <p14:creationId xmlns:p14="http://schemas.microsoft.com/office/powerpoint/2010/main" val="1112920448"/>
+      </p:ext>
+    </p:extLst>
+  </p:cSld>
+  <p:clrMapOvr>
+    <a:masterClrMapping/>
+  </p:clrMapOvr>
+</p:sld>
+</file>
+
 <file path=ppt/slides/slide2.xml><?xml version="1.0" encoding="utf-8"?>
 <p:sld xmlns:a="http://schemas.openxmlformats.org/drawingml/2006/main" xmlns:r="http://schemas.openxmlformats.org/officeDocument/2006/relationships" xmlns:p="http://schemas.openxmlformats.org/presentationml/2006/main">
   <p:cSld>
@@ -3608,7 +3833,11 @@
           <a:lstStyle/>
           <a:p>
             <a:r>
-              <a:rPr lang="fr-FR" dirty="0"/>
+              <a:rPr lang="fr-FR" dirty="0">
+                <a:latin typeface="Calibri" panose="020F0502020204030204" pitchFamily="34" charset="0"/>
+                <a:ea typeface="Cambria" panose="02040503050406030204" pitchFamily="18" charset="0"/>
+                <a:cs typeface="Calibri" panose="020F0502020204030204" pitchFamily="34" charset="0"/>
+              </a:rPr>
               <a:t>Quel est le but ?</a:t>
             </a:r>
           </a:p>
@@ -3632,7 +3861,7 @@
         </p:nvSpPr>
         <p:spPr>
           <a:xfrm>
-            <a:off x="1261872" y="2105638"/>
+            <a:off x="1261872" y="2038526"/>
             <a:ext cx="8595360" cy="4938566"/>
           </a:xfrm>
         </p:spPr>
@@ -3646,44 +3875,60 @@
               <a:buNone/>
             </a:pPr>
             <a:r>
-              <a:rPr lang="fr-FR" sz="2400" dirty="0"/>
+              <a:rPr lang="fr-FR" sz="2400" dirty="0">
+                <a:latin typeface="Calibri" panose="020F0502020204030204" pitchFamily="34" charset="0"/>
+                <a:cs typeface="Calibri" panose="020F0502020204030204" pitchFamily="34" charset="0"/>
+              </a:rPr>
               <a:t>Partir d’un plan </a:t>
             </a:r>
             <a:r>
-              <a:rPr lang="fr-FR" sz="2400" b="1" dirty="0"/>
+              <a:rPr lang="fr-FR" sz="2400" b="1" dirty="0">
+                <a:latin typeface="Calibri" panose="020F0502020204030204" pitchFamily="34" charset="0"/>
+                <a:cs typeface="Calibri" panose="020F0502020204030204" pitchFamily="34" charset="0"/>
+              </a:rPr>
               <a:t>OPEN STREET MAP</a:t>
             </a:r>
             <a:r>
-              <a:rPr lang="fr-FR" sz="2400" dirty="0"/>
+              <a:rPr lang="fr-FR" sz="2400" dirty="0">
+                <a:latin typeface="Calibri" panose="020F0502020204030204" pitchFamily="34" charset="0"/>
+                <a:cs typeface="Calibri" panose="020F0502020204030204" pitchFamily="34" charset="0"/>
+              </a:rPr>
               <a:t> afin d’afficher un plan interactif du campus avec </a:t>
             </a:r>
           </a:p>
           <a:p>
             <a:r>
-              <a:rPr lang="fr-FR" sz="2400" b="1" dirty="0"/>
+              <a:rPr lang="fr-FR" sz="2400" b="1" dirty="0">
+                <a:latin typeface="Calibri" panose="020F0502020204030204" pitchFamily="34" charset="0"/>
+                <a:cs typeface="Calibri" panose="020F0502020204030204" pitchFamily="34" charset="0"/>
+              </a:rPr>
               <a:t>Les écoles</a:t>
             </a:r>
           </a:p>
           <a:p>
             <a:r>
-              <a:rPr lang="fr-FR" sz="2400" b="1" dirty="0"/>
+              <a:rPr lang="fr-FR" sz="2400" b="1" dirty="0">
+                <a:latin typeface="Calibri" panose="020F0502020204030204" pitchFamily="34" charset="0"/>
+                <a:cs typeface="Calibri" panose="020F0502020204030204" pitchFamily="34" charset="0"/>
+              </a:rPr>
               <a:t>Les moyens de transport</a:t>
             </a:r>
           </a:p>
           <a:p>
             <a:r>
-              <a:rPr lang="fr-FR" sz="2400" b="1" dirty="0"/>
-              <a:t>Les Restaurants Rapides et autres </a:t>
-            </a:r>
-            <a:r>
-              <a:rPr lang="fr-FR" sz="2400" b="1" dirty="0" err="1"/>
-              <a:t>pizzarias</a:t>
-            </a:r>
-            <a:endParaRPr lang="fr-FR" sz="2400" b="1" dirty="0"/>
-          </a:p>
-          <a:p>
-            <a:r>
-              <a:rPr lang="fr-FR" sz="2400" b="1" dirty="0"/>
+              <a:rPr lang="fr-FR" sz="2400" b="1" dirty="0">
+                <a:latin typeface="Calibri" panose="020F0502020204030204" pitchFamily="34" charset="0"/>
+                <a:cs typeface="Calibri" panose="020F0502020204030204" pitchFamily="34" charset="0"/>
+              </a:rPr>
+              <a:t>Les Restaurants Rapides et autres pizzerias</a:t>
+            </a:r>
+          </a:p>
+          <a:p>
+            <a:r>
+              <a:rPr lang="fr-FR" sz="2400" b="1" dirty="0">
+                <a:latin typeface="Calibri" panose="020F0502020204030204" pitchFamily="34" charset="0"/>
+                <a:cs typeface="Calibri" panose="020F0502020204030204" pitchFamily="34" charset="0"/>
+              </a:rPr>
               <a:t>Les Supérettes et autres points pratiques</a:t>
             </a:r>
           </a:p>
@@ -4074,7 +4319,7 @@
           <p:cNvPr id="2" name="Titre 1">
             <a:extLst>
               <a:ext uri="{FF2B5EF4-FFF2-40B4-BE49-F238E27FC236}">
-                <a16:creationId xmlns:a16="http://schemas.microsoft.com/office/drawing/2014/main" id="{0CD1A4CF-D6D7-43E4-8965-D8CCDCF8E861}"/>
+                <a16:creationId xmlns:a16="http://schemas.microsoft.com/office/drawing/2014/main" id="{04AB4BF1-E56B-4088-8862-0CD5BFCC547E}"/>
               </a:ext>
             </a:extLst>
           </p:cNvPr>
@@ -4092,7 +4337,7 @@
           <a:p>
             <a:r>
               <a:rPr lang="fr-FR" dirty="0"/>
-              <a:t>Pour cela nous avons</a:t>
+              <a:t>Cheminement du projet</a:t>
             </a:r>
           </a:p>
         </p:txBody>
@@ -4102,7 +4347,7 @@
           <p:cNvPr id="3" name="Espace réservé du contenu 2">
             <a:extLst>
               <a:ext uri="{FF2B5EF4-FFF2-40B4-BE49-F238E27FC236}">
-                <a16:creationId xmlns:a16="http://schemas.microsoft.com/office/drawing/2014/main" id="{0E7BA73E-F0A6-43E8-ABFD-F005C002E06F}"/>
+                <a16:creationId xmlns:a16="http://schemas.microsoft.com/office/drawing/2014/main" id="{1129C1FF-F01F-413B-AC06-AD167B95642A}"/>
               </a:ext>
             </a:extLst>
           </p:cNvPr>
@@ -4115,59 +4360,97 @@
         </p:nvSpPr>
         <p:spPr/>
         <p:txBody>
-          <a:bodyPr>
-            <a:normAutofit/>
-          </a:bodyPr>
+          <a:bodyPr/>
           <a:lstStyle/>
           <a:p>
             <a:r>
-              <a:rPr lang="fr-FR" sz="2400" dirty="0"/>
-              <a:t>Fais le contour des différentes écoles</a:t>
-            </a:r>
-          </a:p>
-          <a:p>
-            <a:r>
-              <a:rPr lang="fr-FR" sz="2400" dirty="0"/>
-              <a:t>Ajouté des marqueurs à chaque point d’intérêt</a:t>
-            </a:r>
-          </a:p>
-          <a:p>
-            <a:r>
-              <a:rPr lang="fr-FR" sz="2400" dirty="0"/>
-              <a:t>Géré le Zoom et les déplacements afin que l’utilisateur ne puisse naviguer hors du campus</a:t>
-            </a:r>
-          </a:p>
-          <a:p>
-            <a:r>
-              <a:rPr lang="fr-FR" sz="2400" dirty="0"/>
-              <a:t>Créé l’affichage d’une fenêtre avec les diverses informations du lieu souhaité</a:t>
-            </a:r>
-          </a:p>
-          <a:p>
-            <a:r>
-              <a:rPr lang="fr-FR" sz="2400" dirty="0"/>
-              <a:t>Redirigé vers les fils d’actualité Twitter de chaque bâtiment</a:t>
-            </a:r>
+              <a:rPr lang="fr-FR" dirty="0"/>
+              <a:t>Création d’un discord et d’un </a:t>
+            </a:r>
+            <a:r>
+              <a:rPr lang="fr-FR" dirty="0" err="1"/>
+              <a:t>Github</a:t>
+            </a:r>
+            <a:endParaRPr lang="fr-FR" dirty="0"/>
+          </a:p>
+          <a:p>
+            <a:r>
+              <a:rPr lang="fr-FR" dirty="0"/>
+              <a:t>Les écoles principales du groupe</a:t>
+            </a:r>
+          </a:p>
+          <a:p>
+            <a:r>
+              <a:rPr lang="fr-FR" dirty="0"/>
+              <a:t>Le détourage des bâtiments</a:t>
+            </a:r>
+          </a:p>
+          <a:p>
+            <a:r>
+              <a:rPr lang="fr-FR" dirty="0"/>
+              <a:t>Ajout des points d’intérêt</a:t>
+            </a:r>
+          </a:p>
+          <a:p>
+            <a:r>
+              <a:rPr lang="fr-FR" dirty="0"/>
+              <a:t>Etablissement du périmètre de la carte</a:t>
+            </a:r>
+          </a:p>
+          <a:p>
+            <a:r>
+              <a:rPr lang="fr-FR" dirty="0"/>
+              <a:t>Récupération infos API Transpole/MEL</a:t>
+            </a:r>
+          </a:p>
+          <a:p>
+            <a:r>
+              <a:rPr lang="fr-FR" dirty="0"/>
+              <a:t>Création des pop-ups propres aux points d’intérêt</a:t>
+            </a:r>
+          </a:p>
+          <a:p>
+            <a:r>
+              <a:rPr lang="fr-FR" dirty="0"/>
+              <a:t>Redirection vers les </a:t>
+            </a:r>
+            <a:r>
+              <a:rPr lang="fr-FR" dirty="0" err="1"/>
+              <a:t>feed</a:t>
+            </a:r>
+            <a:r>
+              <a:rPr lang="fr-FR" dirty="0"/>
+              <a:t> Twitter</a:t>
+            </a:r>
+          </a:p>
+          <a:p>
+            <a:r>
+              <a:rPr lang="fr-FR" dirty="0"/>
+              <a:t>Légende</a:t>
+            </a:r>
+          </a:p>
+          <a:p>
+            <a:endParaRPr lang="fr-FR" dirty="0"/>
           </a:p>
         </p:txBody>
       </p:sp>
     </p:spTree>
     <p:extLst>
       <p:ext uri="{BB962C8B-B14F-4D97-AF65-F5344CB8AC3E}">
-        <p14:creationId xmlns:p14="http://schemas.microsoft.com/office/powerpoint/2010/main" val="4107294754"/>
+        <p14:creationId xmlns:p14="http://schemas.microsoft.com/office/powerpoint/2010/main" val="250363808"/>
       </p:ext>
     </p:extLst>
   </p:cSld>
   <p:clrMapOvr>
     <a:masterClrMapping/>
   </p:clrMapOvr>
-  <mc:AlternateContent xmlns:mc="http://schemas.openxmlformats.org/markup-compatibility/2006" xmlns:p14="http://schemas.microsoft.com/office/powerpoint/2010/main">
-    <mc:Choice Requires="p14">
+  <mc:AlternateContent xmlns:mc="http://schemas.openxmlformats.org/markup-compatibility/2006">
+    <mc:Choice xmlns:p14="http://schemas.microsoft.com/office/powerpoint/2010/main" Requires="p14">
       <p:transition spd="med" p14:dur="700">
         <p:fade/>
       </p:transition>
     </mc:Choice>
-    <mc:Fallback xmlns="">
+    <mc:Fallback>
       <p:transition spd="med">
         <p:fade/>
       </p:transition>
@@ -4486,6 +4769,250 @@
                       </p:childTnLst>
                     </p:cTn>
                   </p:par>
+                  <p:par>
+                    <p:cTn id="28" fill="hold">
+                      <p:stCondLst>
+                        <p:cond delay="indefinite"/>
+                      </p:stCondLst>
+                      <p:childTnLst>
+                        <p:par>
+                          <p:cTn id="29" fill="hold">
+                            <p:stCondLst>
+                              <p:cond delay="0"/>
+                            </p:stCondLst>
+                            <p:childTnLst>
+                              <p:par>
+                                <p:cTn id="30" presetID="10" presetClass="entr" presetSubtype="0" fill="hold" grpId="0" nodeType="clickEffect">
+                                  <p:stCondLst>
+                                    <p:cond delay="0"/>
+                                  </p:stCondLst>
+                                  <p:childTnLst>
+                                    <p:set>
+                                      <p:cBhvr>
+                                        <p:cTn id="31" dur="1" fill="hold">
+                                          <p:stCondLst>
+                                            <p:cond delay="0"/>
+                                          </p:stCondLst>
+                                        </p:cTn>
+                                        <p:tgtEl>
+                                          <p:spTgt spid="3">
+                                            <p:txEl>
+                                              <p:pRg st="5" end="5"/>
+                                            </p:txEl>
+                                          </p:spTgt>
+                                        </p:tgtEl>
+                                        <p:attrNameLst>
+                                          <p:attrName>style.visibility</p:attrName>
+                                        </p:attrNameLst>
+                                      </p:cBhvr>
+                                      <p:to>
+                                        <p:strVal val="visible"/>
+                                      </p:to>
+                                    </p:set>
+                                    <p:animEffect transition="in" filter="fade">
+                                      <p:cBhvr>
+                                        <p:cTn id="32" dur="500"/>
+                                        <p:tgtEl>
+                                          <p:spTgt spid="3">
+                                            <p:txEl>
+                                              <p:pRg st="5" end="5"/>
+                                            </p:txEl>
+                                          </p:spTgt>
+                                        </p:tgtEl>
+                                      </p:cBhvr>
+                                    </p:animEffect>
+                                  </p:childTnLst>
+                                </p:cTn>
+                              </p:par>
+                            </p:childTnLst>
+                          </p:cTn>
+                        </p:par>
+                      </p:childTnLst>
+                    </p:cTn>
+                  </p:par>
+                  <p:par>
+                    <p:cTn id="33" fill="hold">
+                      <p:stCondLst>
+                        <p:cond delay="indefinite"/>
+                      </p:stCondLst>
+                      <p:childTnLst>
+                        <p:par>
+                          <p:cTn id="34" fill="hold">
+                            <p:stCondLst>
+                              <p:cond delay="0"/>
+                            </p:stCondLst>
+                            <p:childTnLst>
+                              <p:par>
+                                <p:cTn id="35" presetID="10" presetClass="entr" presetSubtype="0" fill="hold" grpId="0" nodeType="clickEffect">
+                                  <p:stCondLst>
+                                    <p:cond delay="0"/>
+                                  </p:stCondLst>
+                                  <p:childTnLst>
+                                    <p:set>
+                                      <p:cBhvr>
+                                        <p:cTn id="36" dur="1" fill="hold">
+                                          <p:stCondLst>
+                                            <p:cond delay="0"/>
+                                          </p:stCondLst>
+                                        </p:cTn>
+                                        <p:tgtEl>
+                                          <p:spTgt spid="3">
+                                            <p:txEl>
+                                              <p:pRg st="6" end="6"/>
+                                            </p:txEl>
+                                          </p:spTgt>
+                                        </p:tgtEl>
+                                        <p:attrNameLst>
+                                          <p:attrName>style.visibility</p:attrName>
+                                        </p:attrNameLst>
+                                      </p:cBhvr>
+                                      <p:to>
+                                        <p:strVal val="visible"/>
+                                      </p:to>
+                                    </p:set>
+                                    <p:animEffect transition="in" filter="fade">
+                                      <p:cBhvr>
+                                        <p:cTn id="37" dur="500"/>
+                                        <p:tgtEl>
+                                          <p:spTgt spid="3">
+                                            <p:txEl>
+                                              <p:pRg st="6" end="6"/>
+                                            </p:txEl>
+                                          </p:spTgt>
+                                        </p:tgtEl>
+                                      </p:cBhvr>
+                                    </p:animEffect>
+                                  </p:childTnLst>
+                                </p:cTn>
+                              </p:par>
+                            </p:childTnLst>
+                          </p:cTn>
+                        </p:par>
+                      </p:childTnLst>
+                    </p:cTn>
+                  </p:par>
+                  <p:par>
+                    <p:cTn id="38" fill="hold">
+                      <p:stCondLst>
+                        <p:cond delay="indefinite"/>
+                      </p:stCondLst>
+                      <p:childTnLst>
+                        <p:par>
+                          <p:cTn id="39" fill="hold">
+                            <p:stCondLst>
+                              <p:cond delay="0"/>
+                            </p:stCondLst>
+                            <p:childTnLst>
+                              <p:par>
+                                <p:cTn id="40" presetID="10" presetClass="entr" presetSubtype="0" fill="hold" grpId="0" nodeType="clickEffect">
+                                  <p:stCondLst>
+                                    <p:cond delay="0"/>
+                                  </p:stCondLst>
+                                  <p:childTnLst>
+                                    <p:set>
+                                      <p:cBhvr>
+                                        <p:cTn id="41" dur="1" fill="hold">
+                                          <p:stCondLst>
+                                            <p:cond delay="0"/>
+                                          </p:stCondLst>
+                                        </p:cTn>
+                                        <p:tgtEl>
+                                          <p:spTgt spid="3">
+                                            <p:txEl>
+                                              <p:pRg st="7" end="7"/>
+                                            </p:txEl>
+                                          </p:spTgt>
+                                        </p:tgtEl>
+                                        <p:attrNameLst>
+                                          <p:attrName>style.visibility</p:attrName>
+                                        </p:attrNameLst>
+                                      </p:cBhvr>
+                                      <p:to>
+                                        <p:strVal val="visible"/>
+                                      </p:to>
+                                    </p:set>
+                                    <p:animEffect transition="in" filter="fade">
+                                      <p:cBhvr>
+                                        <p:cTn id="42" dur="500"/>
+                                        <p:tgtEl>
+                                          <p:spTgt spid="3">
+                                            <p:txEl>
+                                              <p:pRg st="7" end="7"/>
+                                            </p:txEl>
+                                          </p:spTgt>
+                                        </p:tgtEl>
+                                      </p:cBhvr>
+                                    </p:animEffect>
+                                  </p:childTnLst>
+                                </p:cTn>
+                              </p:par>
+                            </p:childTnLst>
+                          </p:cTn>
+                        </p:par>
+                      </p:childTnLst>
+                    </p:cTn>
+                  </p:par>
+                  <p:par>
+                    <p:cTn id="43" fill="hold">
+                      <p:stCondLst>
+                        <p:cond delay="indefinite"/>
+                      </p:stCondLst>
+                      <p:childTnLst>
+                        <p:par>
+                          <p:cTn id="44" fill="hold">
+                            <p:stCondLst>
+                              <p:cond delay="0"/>
+                            </p:stCondLst>
+                            <p:childTnLst>
+                              <p:par>
+                                <p:cTn id="45" presetID="10" presetClass="entr" presetSubtype="0" fill="hold" grpId="0" nodeType="clickEffect">
+                                  <p:stCondLst>
+                                    <p:cond delay="0"/>
+                                  </p:stCondLst>
+                                  <p:childTnLst>
+                                    <p:set>
+                                      <p:cBhvr>
+                                        <p:cTn id="46" dur="1" fill="hold">
+                                          <p:stCondLst>
+                                            <p:cond delay="0"/>
+                                          </p:stCondLst>
+                                        </p:cTn>
+                                        <p:tgtEl>
+                                          <p:spTgt spid="3">
+                                            <p:txEl>
+                                              <p:pRg st="8" end="8"/>
+                                            </p:txEl>
+                                          </p:spTgt>
+                                        </p:tgtEl>
+                                        <p:attrNameLst>
+                                          <p:attrName>style.visibility</p:attrName>
+                                        </p:attrNameLst>
+                                      </p:cBhvr>
+                                      <p:to>
+                                        <p:strVal val="visible"/>
+                                      </p:to>
+                                    </p:set>
+                                    <p:animEffect transition="in" filter="fade">
+                                      <p:cBhvr>
+                                        <p:cTn id="47" dur="500"/>
+                                        <p:tgtEl>
+                                          <p:spTgt spid="3">
+                                            <p:txEl>
+                                              <p:pRg st="8" end="8"/>
+                                            </p:txEl>
+                                          </p:spTgt>
+                                        </p:tgtEl>
+                                      </p:cBhvr>
+                                    </p:animEffect>
+                                  </p:childTnLst>
+                                </p:cTn>
+                              </p:par>
+                            </p:childTnLst>
+                          </p:cTn>
+                        </p:par>
+                      </p:childTnLst>
+                    </p:cTn>
+                  </p:par>
                 </p:childTnLst>
               </p:cTn>
               <p:prevCondLst>
@@ -4533,10 +5060,10 @@
       </p:grpSpPr>
       <p:sp>
         <p:nvSpPr>
-          <p:cNvPr id="5" name="Titre 4">
+          <p:cNvPr id="2" name="Titre 1">
             <a:extLst>
               <a:ext uri="{FF2B5EF4-FFF2-40B4-BE49-F238E27FC236}">
-                <a16:creationId xmlns:a16="http://schemas.microsoft.com/office/drawing/2014/main" id="{BC354196-051F-46F8-A93D-EC43C698B56D}"/>
+                <a16:creationId xmlns:a16="http://schemas.microsoft.com/office/drawing/2014/main" id="{64B3EA1F-65F4-45DF-9309-44DA9692F72C}"/>
               </a:ext>
             </a:extLst>
           </p:cNvPr>
@@ -4554,26 +5081,115 @@
           <a:p>
             <a:r>
               <a:rPr lang="fr-FR" dirty="0"/>
-              <a:t>Le résultat</a:t>
-            </a:r>
+              <a:t>Que pouvons nous voir sur la </a:t>
+            </a:r>
+            <a:r>
+              <a:rPr lang="fr-FR" dirty="0" err="1"/>
+              <a:t>map</a:t>
+            </a:r>
+            <a:r>
+              <a:rPr lang="fr-FR" dirty="0"/>
+              <a:t> ?</a:t>
+            </a:r>
+          </a:p>
+        </p:txBody>
+      </p:sp>
+      <p:sp>
+        <p:nvSpPr>
+          <p:cNvPr id="3" name="Espace réservé du contenu 2">
+            <a:extLst>
+              <a:ext uri="{FF2B5EF4-FFF2-40B4-BE49-F238E27FC236}">
+                <a16:creationId xmlns:a16="http://schemas.microsoft.com/office/drawing/2014/main" id="{DAC88A16-3D58-46E5-9EE6-58F988C1DBC5}"/>
+              </a:ext>
+            </a:extLst>
+          </p:cNvPr>
+          <p:cNvSpPr>
+            <a:spLocks noGrp="1"/>
+          </p:cNvSpPr>
+          <p:nvPr>
+            <p:ph idx="1"/>
+          </p:nvPr>
+        </p:nvSpPr>
+        <p:spPr/>
+        <p:txBody>
+          <a:bodyPr/>
+          <a:lstStyle/>
+          <a:p>
+            <a:r>
+              <a:rPr lang="fr-FR" dirty="0"/>
+              <a:t>Les écoles du groupe</a:t>
+            </a:r>
+          </a:p>
+          <a:p>
+            <a:r>
+              <a:rPr lang="fr-FR" dirty="0"/>
+              <a:t>Les sandwicheries et pizzerias alentours</a:t>
+            </a:r>
+          </a:p>
+          <a:p>
+            <a:r>
+              <a:rPr lang="fr-FR" dirty="0"/>
+              <a:t>Les arrêts de Bus</a:t>
+            </a:r>
+          </a:p>
+          <a:p>
+            <a:r>
+              <a:rPr lang="fr-FR" dirty="0"/>
+              <a:t>Les dépôts </a:t>
+            </a:r>
+            <a:r>
+              <a:rPr lang="fr-FR" dirty="0" err="1"/>
+              <a:t>Vlille</a:t>
+            </a:r>
+            <a:endParaRPr lang="fr-FR" dirty="0"/>
+          </a:p>
+          <a:p>
+            <a:r>
+              <a:rPr lang="fr-FR" dirty="0"/>
+              <a:t>Les métros</a:t>
+            </a:r>
+          </a:p>
+          <a:p>
+            <a:r>
+              <a:rPr lang="fr-FR" dirty="0"/>
+              <a:t>Les Distributeurs Automatique de Billets</a:t>
+            </a:r>
+          </a:p>
+          <a:p>
+            <a:r>
+              <a:rPr lang="fr-FR" dirty="0"/>
+              <a:t>Les supermarchés</a:t>
+            </a:r>
+          </a:p>
+          <a:p>
+            <a:r>
+              <a:rPr lang="fr-FR" dirty="0"/>
+              <a:t>Une redirection vers le travail du groupe qui gère la température d’</a:t>
+            </a:r>
+            <a:r>
+              <a:rPr lang="fr-FR" dirty="0" err="1"/>
+              <a:t>Urbawood</a:t>
+            </a:r>
+            <a:endParaRPr lang="fr-FR" dirty="0"/>
+          </a:p>
+          <a:p>
+            <a:endParaRPr lang="fr-FR" dirty="0"/>
           </a:p>
         </p:txBody>
       </p:sp>
       <p:pic>
         <p:nvPicPr>
-          <p:cNvPr id="8" name="Espace réservé du contenu 7">
+          <p:cNvPr id="8" name="Image 7">
             <a:extLst>
               <a:ext uri="{FF2B5EF4-FFF2-40B4-BE49-F238E27FC236}">
-                <a16:creationId xmlns:a16="http://schemas.microsoft.com/office/drawing/2014/main" id="{AD4E0D21-E34C-406C-8D2A-A21FB1BB5465}"/>
+                <a16:creationId xmlns:a16="http://schemas.microsoft.com/office/drawing/2014/main" id="{0FFCCF87-2154-458A-9989-4BD445993951}"/>
               </a:ext>
             </a:extLst>
           </p:cNvPr>
           <p:cNvPicPr>
-            <a:picLocks noGrp="1" noChangeAspect="1"/>
+            <a:picLocks noChangeAspect="1"/>
           </p:cNvPicPr>
-          <p:nvPr>
-            <p:ph sz="half" idx="1"/>
-          </p:nvPr>
+          <p:nvPr/>
         </p:nvPicPr>
         <p:blipFill>
           <a:blip r:embed="rId2"/>
@@ -4583,8 +5199,8 @@
         </p:blipFill>
         <p:spPr>
           <a:xfrm>
-            <a:off x="344968" y="2576939"/>
-            <a:ext cx="5720553" cy="3018518"/>
+            <a:off x="5995088" y="2023872"/>
+            <a:ext cx="938786" cy="938786"/>
           </a:xfrm>
           <a:prstGeom prst="rect">
             <a:avLst/>
@@ -4593,29 +5209,208 @@
       </p:pic>
       <p:pic>
         <p:nvPicPr>
-          <p:cNvPr id="9" name="Espace réservé du contenu 8">
+          <p:cNvPr id="10" name="Image 9">
             <a:extLst>
               <a:ext uri="{FF2B5EF4-FFF2-40B4-BE49-F238E27FC236}">
-                <a16:creationId xmlns:a16="http://schemas.microsoft.com/office/drawing/2014/main" id="{B369910D-829E-45DA-9E54-3D923FFC40D4}"/>
+                <a16:creationId xmlns:a16="http://schemas.microsoft.com/office/drawing/2014/main" id="{B410B771-C7EC-49D9-B7EA-DB8D94797F00}"/>
               </a:ext>
             </a:extLst>
           </p:cNvPr>
           <p:cNvPicPr>
-            <a:picLocks noGrp="1" noChangeAspect="1"/>
+            <a:picLocks noChangeAspect="1"/>
           </p:cNvPicPr>
-          <p:nvPr>
-            <p:ph sz="half" idx="2"/>
-          </p:nvPr>
+          <p:nvPr/>
         </p:nvPicPr>
-        <p:blipFill rotWithShape="1">
+        <p:blipFill>
           <a:blip r:embed="rId3"/>
-          <a:srcRect r="27621"/>
-          <a:stretch/>
+          <a:stretch>
+            <a:fillRect/>
+          </a:stretch>
         </p:blipFill>
         <p:spPr>
           <a:xfrm>
-            <a:off x="6603143" y="2576939"/>
-            <a:ext cx="4351369" cy="3018518"/>
+            <a:off x="3679712" y="2643132"/>
+            <a:ext cx="481067" cy="481067"/>
+          </a:xfrm>
+          <a:prstGeom prst="rect">
+            <a:avLst/>
+          </a:prstGeom>
+        </p:spPr>
+      </p:pic>
+      <p:pic>
+        <p:nvPicPr>
+          <p:cNvPr id="12" name="Image 11">
+            <a:extLst>
+              <a:ext uri="{FF2B5EF4-FFF2-40B4-BE49-F238E27FC236}">
+                <a16:creationId xmlns:a16="http://schemas.microsoft.com/office/drawing/2014/main" id="{4F9F1019-E154-4396-9C84-9750D8BCF610}"/>
+              </a:ext>
+            </a:extLst>
+          </p:cNvPr>
+          <p:cNvPicPr>
+            <a:picLocks noChangeAspect="1"/>
+          </p:cNvPicPr>
+          <p:nvPr/>
+        </p:nvPicPr>
+        <p:blipFill>
+          <a:blip r:embed="rId4"/>
+          <a:stretch>
+            <a:fillRect/>
+          </a:stretch>
+        </p:blipFill>
+        <p:spPr>
+          <a:xfrm>
+            <a:off x="3551178" y="3115900"/>
+            <a:ext cx="609601" cy="609601"/>
+          </a:xfrm>
+          <a:prstGeom prst="rect">
+            <a:avLst/>
+          </a:prstGeom>
+        </p:spPr>
+      </p:pic>
+      <p:pic>
+        <p:nvPicPr>
+          <p:cNvPr id="14" name="Image 13">
+            <a:extLst>
+              <a:ext uri="{FF2B5EF4-FFF2-40B4-BE49-F238E27FC236}">
+                <a16:creationId xmlns:a16="http://schemas.microsoft.com/office/drawing/2014/main" id="{5E4D8990-078E-4457-9B69-CF1902CD8246}"/>
+              </a:ext>
+            </a:extLst>
+          </p:cNvPr>
+          <p:cNvPicPr>
+            <a:picLocks noChangeAspect="1"/>
+          </p:cNvPicPr>
+          <p:nvPr/>
+        </p:nvPicPr>
+        <p:blipFill>
+          <a:blip r:embed="rId5"/>
+          <a:stretch>
+            <a:fillRect/>
+          </a:stretch>
+        </p:blipFill>
+        <p:spPr>
+          <a:xfrm>
+            <a:off x="2938271" y="3691368"/>
+            <a:ext cx="313100" cy="313100"/>
+          </a:xfrm>
+          <a:prstGeom prst="rect">
+            <a:avLst/>
+          </a:prstGeom>
+        </p:spPr>
+      </p:pic>
+      <p:pic>
+        <p:nvPicPr>
+          <p:cNvPr id="16" name="Image 15">
+            <a:extLst>
+              <a:ext uri="{FF2B5EF4-FFF2-40B4-BE49-F238E27FC236}">
+                <a16:creationId xmlns:a16="http://schemas.microsoft.com/office/drawing/2014/main" id="{87B68AB4-87DC-4E3C-81ED-1449A84DFB8A}"/>
+              </a:ext>
+            </a:extLst>
+          </p:cNvPr>
+          <p:cNvPicPr>
+            <a:picLocks noChangeAspect="1"/>
+          </p:cNvPicPr>
+          <p:nvPr/>
+        </p:nvPicPr>
+        <p:blipFill>
+          <a:blip r:embed="rId6"/>
+          <a:stretch>
+            <a:fillRect/>
+          </a:stretch>
+        </p:blipFill>
+        <p:spPr>
+          <a:xfrm>
+            <a:off x="3551178" y="4565388"/>
+            <a:ext cx="454153" cy="454153"/>
+          </a:xfrm>
+          <a:prstGeom prst="rect">
+            <a:avLst/>
+          </a:prstGeom>
+        </p:spPr>
+      </p:pic>
+      <p:pic>
+        <p:nvPicPr>
+          <p:cNvPr id="18" name="Image 17">
+            <a:extLst>
+              <a:ext uri="{FF2B5EF4-FFF2-40B4-BE49-F238E27FC236}">
+                <a16:creationId xmlns:a16="http://schemas.microsoft.com/office/drawing/2014/main" id="{79813660-A231-4CA2-8C46-0E9A3C390201}"/>
+              </a:ext>
+            </a:extLst>
+          </p:cNvPr>
+          <p:cNvPicPr>
+            <a:picLocks noChangeAspect="1"/>
+          </p:cNvPicPr>
+          <p:nvPr/>
+        </p:nvPicPr>
+        <p:blipFill>
+          <a:blip r:embed="rId7"/>
+          <a:stretch>
+            <a:fillRect/>
+          </a:stretch>
+        </p:blipFill>
+        <p:spPr>
+          <a:xfrm>
+            <a:off x="5995088" y="4188356"/>
+            <a:ext cx="377032" cy="377032"/>
+          </a:xfrm>
+          <a:prstGeom prst="rect">
+            <a:avLst/>
+          </a:prstGeom>
+        </p:spPr>
+      </p:pic>
+      <p:pic>
+        <p:nvPicPr>
+          <p:cNvPr id="20" name="Image 19" descr="Une image contenant objet&#10;&#10;Description générée avec un niveau de confiance élevé">
+            <a:extLst>
+              <a:ext uri="{FF2B5EF4-FFF2-40B4-BE49-F238E27FC236}">
+                <a16:creationId xmlns:a16="http://schemas.microsoft.com/office/drawing/2014/main" id="{E6C54F86-9F13-4C73-8F05-F1B365792874}"/>
+              </a:ext>
+            </a:extLst>
+          </p:cNvPr>
+          <p:cNvPicPr>
+            <a:picLocks noChangeAspect="1"/>
+          </p:cNvPicPr>
+          <p:nvPr/>
+        </p:nvPicPr>
+        <p:blipFill>
+          <a:blip r:embed="rId8"/>
+          <a:stretch>
+            <a:fillRect/>
+          </a:stretch>
+        </p:blipFill>
+        <p:spPr>
+          <a:xfrm>
+            <a:off x="8505821" y="5191125"/>
+            <a:ext cx="438154" cy="438154"/>
+          </a:xfrm>
+          <a:prstGeom prst="rect">
+            <a:avLst/>
+          </a:prstGeom>
+        </p:spPr>
+      </p:pic>
+      <p:pic>
+        <p:nvPicPr>
+          <p:cNvPr id="22" name="Image 21" descr="Une image contenant texte&#10;&#10;Description générée avec un niveau de confiance très élevé">
+            <a:extLst>
+              <a:ext uri="{FF2B5EF4-FFF2-40B4-BE49-F238E27FC236}">
+                <a16:creationId xmlns:a16="http://schemas.microsoft.com/office/drawing/2014/main" id="{57A49AFD-C0C9-495C-AE98-4F39D59928B7}"/>
+              </a:ext>
+            </a:extLst>
+          </p:cNvPr>
+          <p:cNvPicPr>
+            <a:picLocks noChangeAspect="1"/>
+          </p:cNvPicPr>
+          <p:nvPr/>
+        </p:nvPicPr>
+        <p:blipFill>
+          <a:blip r:embed="rId9"/>
+          <a:stretch>
+            <a:fillRect/>
+          </a:stretch>
+        </p:blipFill>
+        <p:spPr>
+          <a:xfrm>
+            <a:off x="3764797" y="1790552"/>
+            <a:ext cx="481067" cy="481067"/>
           </a:xfrm>
           <a:prstGeom prst="rect">
             <a:avLst/>
@@ -4625,25 +5420,13 @@
     </p:spTree>
     <p:extLst>
       <p:ext uri="{BB962C8B-B14F-4D97-AF65-F5344CB8AC3E}">
-        <p14:creationId xmlns:p14="http://schemas.microsoft.com/office/powerpoint/2010/main" val="1036171397"/>
+        <p14:creationId xmlns:p14="http://schemas.microsoft.com/office/powerpoint/2010/main" val="3056205489"/>
       </p:ext>
     </p:extLst>
   </p:cSld>
   <p:clrMapOvr>
     <a:masterClrMapping/>
   </p:clrMapOvr>
-  <mc:AlternateContent xmlns:mc="http://schemas.openxmlformats.org/markup-compatibility/2006" xmlns:p14="http://schemas.microsoft.com/office/powerpoint/2010/main">
-    <mc:Choice Requires="p14">
-      <p:transition spd="med" p14:dur="700">
-        <p:fade/>
-      </p:transition>
-    </mc:Choice>
-    <mc:Fallback xmlns="">
-      <p:transition spd="med">
-        <p:fade/>
-      </p:transition>
-    </mc:Fallback>
-  </mc:AlternateContent>
   <p:timing>
     <p:tnLst>
       <p:par>
@@ -4665,7 +5448,7 @@
                             </p:stCondLst>
                             <p:childTnLst>
                               <p:par>
-                                <p:cTn id="5" presetID="10" presetClass="entr" presetSubtype="0" fill="hold" nodeType="clickEffect">
+                                <p:cTn id="5" presetID="10" presetClass="entr" presetSubtype="0" fill="hold" grpId="0" nodeType="clickEffect">
                                   <p:stCondLst>
                                     <p:cond delay="0"/>
                                   </p:stCondLst>
@@ -4673,6 +5456,145 @@
                                     <p:set>
                                       <p:cBhvr>
                                         <p:cTn id="6" dur="1" fill="hold">
+                                          <p:stCondLst>
+                                            <p:cond delay="0"/>
+                                          </p:stCondLst>
+                                        </p:cTn>
+                                        <p:tgtEl>
+                                          <p:spTgt spid="3">
+                                            <p:txEl>
+                                              <p:pRg st="0" end="0"/>
+                                            </p:txEl>
+                                          </p:spTgt>
+                                        </p:tgtEl>
+                                        <p:attrNameLst>
+                                          <p:attrName>style.visibility</p:attrName>
+                                        </p:attrNameLst>
+                                      </p:cBhvr>
+                                      <p:to>
+                                        <p:strVal val="visible"/>
+                                      </p:to>
+                                    </p:set>
+                                    <p:animEffect transition="in" filter="fade">
+                                      <p:cBhvr>
+                                        <p:cTn id="7" dur="500"/>
+                                        <p:tgtEl>
+                                          <p:spTgt spid="3">
+                                            <p:txEl>
+                                              <p:pRg st="0" end="0"/>
+                                            </p:txEl>
+                                          </p:spTgt>
+                                        </p:tgtEl>
+                                      </p:cBhvr>
+                                    </p:animEffect>
+                                  </p:childTnLst>
+                                </p:cTn>
+                              </p:par>
+                              <p:par>
+                                <p:cTn id="8" presetID="10" presetClass="entr" presetSubtype="0" fill="hold" nodeType="withEffect">
+                                  <p:stCondLst>
+                                    <p:cond delay="0"/>
+                                  </p:stCondLst>
+                                  <p:childTnLst>
+                                    <p:set>
+                                      <p:cBhvr>
+                                        <p:cTn id="9" dur="1" fill="hold">
+                                          <p:stCondLst>
+                                            <p:cond delay="0"/>
+                                          </p:stCondLst>
+                                        </p:cTn>
+                                        <p:tgtEl>
+                                          <p:spTgt spid="22"/>
+                                        </p:tgtEl>
+                                        <p:attrNameLst>
+                                          <p:attrName>style.visibility</p:attrName>
+                                        </p:attrNameLst>
+                                      </p:cBhvr>
+                                      <p:to>
+                                        <p:strVal val="visible"/>
+                                      </p:to>
+                                    </p:set>
+                                    <p:animEffect transition="in" filter="fade">
+                                      <p:cBhvr>
+                                        <p:cTn id="10" dur="500"/>
+                                        <p:tgtEl>
+                                          <p:spTgt spid="22"/>
+                                        </p:tgtEl>
+                                      </p:cBhvr>
+                                    </p:animEffect>
+                                  </p:childTnLst>
+                                </p:cTn>
+                              </p:par>
+                            </p:childTnLst>
+                          </p:cTn>
+                        </p:par>
+                      </p:childTnLst>
+                    </p:cTn>
+                  </p:par>
+                  <p:par>
+                    <p:cTn id="11" fill="hold">
+                      <p:stCondLst>
+                        <p:cond delay="indefinite"/>
+                      </p:stCondLst>
+                      <p:childTnLst>
+                        <p:par>
+                          <p:cTn id="12" fill="hold">
+                            <p:stCondLst>
+                              <p:cond delay="0"/>
+                            </p:stCondLst>
+                            <p:childTnLst>
+                              <p:par>
+                                <p:cTn id="13" presetID="10" presetClass="entr" presetSubtype="0" fill="hold" grpId="0" nodeType="clickEffect">
+                                  <p:stCondLst>
+                                    <p:cond delay="0"/>
+                                  </p:stCondLst>
+                                  <p:childTnLst>
+                                    <p:set>
+                                      <p:cBhvr>
+                                        <p:cTn id="14" dur="1" fill="hold">
+                                          <p:stCondLst>
+                                            <p:cond delay="0"/>
+                                          </p:stCondLst>
+                                        </p:cTn>
+                                        <p:tgtEl>
+                                          <p:spTgt spid="3">
+                                            <p:txEl>
+                                              <p:pRg st="1" end="1"/>
+                                            </p:txEl>
+                                          </p:spTgt>
+                                        </p:tgtEl>
+                                        <p:attrNameLst>
+                                          <p:attrName>style.visibility</p:attrName>
+                                        </p:attrNameLst>
+                                      </p:cBhvr>
+                                      <p:to>
+                                        <p:strVal val="visible"/>
+                                      </p:to>
+                                    </p:set>
+                                    <p:animEffect transition="in" filter="fade">
+                                      <p:cBhvr>
+                                        <p:cTn id="15" dur="500"/>
+                                        <p:tgtEl>
+                                          <p:spTgt spid="3">
+                                            <p:txEl>
+                                              <p:pRg st="1" end="1"/>
+                                            </p:txEl>
+                                          </p:spTgt>
+                                        </p:tgtEl>
+                                      </p:cBhvr>
+                                    </p:animEffect>
+                                  </p:childTnLst>
+                                </p:cTn>
+                              </p:par>
+                              <p:par>
+                                <p:cTn id="16" presetID="10" presetClass="entr" presetSubtype="0" fill="hold" nodeType="withEffect">
+                                  <p:stCondLst>
+                                    <p:cond delay="0"/>
+                                  </p:stCondLst>
+                                  <p:childTnLst>
+                                    <p:set>
+                                      <p:cBhvr>
+                                        <p:cTn id="17" dur="1" fill="hold">
                                           <p:stCondLst>
                                             <p:cond delay="0"/>
                                           </p:stCondLst>
@@ -4690,7 +5612,7 @@
                                     </p:set>
                                     <p:animEffect transition="in" filter="fade">
                                       <p:cBhvr>
-                                        <p:cTn id="7" dur="500"/>
+                                        <p:cTn id="18" dur="500"/>
                                         <p:tgtEl>
                                           <p:spTgt spid="8"/>
                                         </p:tgtEl>
@@ -4706,32 +5628,36 @@
                     </p:cTn>
                   </p:par>
                   <p:par>
-                    <p:cTn id="8" fill="hold">
+                    <p:cTn id="19" fill="hold">
                       <p:stCondLst>
                         <p:cond delay="indefinite"/>
                       </p:stCondLst>
                       <p:childTnLst>
                         <p:par>
-                          <p:cTn id="9" fill="hold">
+                          <p:cTn id="20" fill="hold">
                             <p:stCondLst>
                               <p:cond delay="0"/>
                             </p:stCondLst>
                             <p:childTnLst>
                               <p:par>
-                                <p:cTn id="10" presetID="10" presetClass="entr" presetSubtype="0" fill="hold" nodeType="clickEffect">
+                                <p:cTn id="21" presetID="10" presetClass="entr" presetSubtype="0" fill="hold" grpId="0" nodeType="clickEffect">
                                   <p:stCondLst>
                                     <p:cond delay="0"/>
                                   </p:stCondLst>
                                   <p:childTnLst>
                                     <p:set>
                                       <p:cBhvr>
-                                        <p:cTn id="11" dur="1" fill="hold">
+                                        <p:cTn id="22" dur="1" fill="hold">
                                           <p:stCondLst>
                                             <p:cond delay="0"/>
                                           </p:stCondLst>
                                         </p:cTn>
                                         <p:tgtEl>
-                                          <p:spTgt spid="9"/>
+                                          <p:spTgt spid="3">
+                                            <p:txEl>
+                                              <p:pRg st="2" end="2"/>
+                                            </p:txEl>
+                                          </p:spTgt>
                                         </p:tgtEl>
                                         <p:attrNameLst>
                                           <p:attrName>style.visibility</p:attrName>
@@ -4743,9 +5669,528 @@
                                     </p:set>
                                     <p:animEffect transition="in" filter="fade">
                                       <p:cBhvr>
-                                        <p:cTn id="12" dur="500"/>
+                                        <p:cTn id="23" dur="500"/>
                                         <p:tgtEl>
-                                          <p:spTgt spid="9"/>
+                                          <p:spTgt spid="3">
+                                            <p:txEl>
+                                              <p:pRg st="2" end="2"/>
+                                            </p:txEl>
+                                          </p:spTgt>
+                                        </p:tgtEl>
+                                      </p:cBhvr>
+                                    </p:animEffect>
+                                  </p:childTnLst>
+                                </p:cTn>
+                              </p:par>
+                              <p:par>
+                                <p:cTn id="24" presetID="10" presetClass="entr" presetSubtype="0" fill="hold" nodeType="withEffect">
+                                  <p:stCondLst>
+                                    <p:cond delay="0"/>
+                                  </p:stCondLst>
+                                  <p:childTnLst>
+                                    <p:set>
+                                      <p:cBhvr>
+                                        <p:cTn id="25" dur="1" fill="hold">
+                                          <p:stCondLst>
+                                            <p:cond delay="0"/>
+                                          </p:stCondLst>
+                                        </p:cTn>
+                                        <p:tgtEl>
+                                          <p:spTgt spid="10"/>
+                                        </p:tgtEl>
+                                        <p:attrNameLst>
+                                          <p:attrName>style.visibility</p:attrName>
+                                        </p:attrNameLst>
+                                      </p:cBhvr>
+                                      <p:to>
+                                        <p:strVal val="visible"/>
+                                      </p:to>
+                                    </p:set>
+                                    <p:animEffect transition="in" filter="fade">
+                                      <p:cBhvr>
+                                        <p:cTn id="26" dur="500"/>
+                                        <p:tgtEl>
+                                          <p:spTgt spid="10"/>
+                                        </p:tgtEl>
+                                      </p:cBhvr>
+                                    </p:animEffect>
+                                  </p:childTnLst>
+                                </p:cTn>
+                              </p:par>
+                            </p:childTnLst>
+                          </p:cTn>
+                        </p:par>
+                      </p:childTnLst>
+                    </p:cTn>
+                  </p:par>
+                  <p:par>
+                    <p:cTn id="27" fill="hold">
+                      <p:stCondLst>
+                        <p:cond delay="indefinite"/>
+                      </p:stCondLst>
+                      <p:childTnLst>
+                        <p:par>
+                          <p:cTn id="28" fill="hold">
+                            <p:stCondLst>
+                              <p:cond delay="0"/>
+                            </p:stCondLst>
+                            <p:childTnLst>
+                              <p:par>
+                                <p:cTn id="29" presetID="10" presetClass="entr" presetSubtype="0" fill="hold" grpId="0" nodeType="clickEffect">
+                                  <p:stCondLst>
+                                    <p:cond delay="0"/>
+                                  </p:stCondLst>
+                                  <p:childTnLst>
+                                    <p:set>
+                                      <p:cBhvr>
+                                        <p:cTn id="30" dur="1" fill="hold">
+                                          <p:stCondLst>
+                                            <p:cond delay="0"/>
+                                          </p:stCondLst>
+                                        </p:cTn>
+                                        <p:tgtEl>
+                                          <p:spTgt spid="3">
+                                            <p:txEl>
+                                              <p:pRg st="3" end="3"/>
+                                            </p:txEl>
+                                          </p:spTgt>
+                                        </p:tgtEl>
+                                        <p:attrNameLst>
+                                          <p:attrName>style.visibility</p:attrName>
+                                        </p:attrNameLst>
+                                      </p:cBhvr>
+                                      <p:to>
+                                        <p:strVal val="visible"/>
+                                      </p:to>
+                                    </p:set>
+                                    <p:animEffect transition="in" filter="fade">
+                                      <p:cBhvr>
+                                        <p:cTn id="31" dur="500"/>
+                                        <p:tgtEl>
+                                          <p:spTgt spid="3">
+                                            <p:txEl>
+                                              <p:pRg st="3" end="3"/>
+                                            </p:txEl>
+                                          </p:spTgt>
+                                        </p:tgtEl>
+                                      </p:cBhvr>
+                                    </p:animEffect>
+                                  </p:childTnLst>
+                                </p:cTn>
+                              </p:par>
+                              <p:par>
+                                <p:cTn id="32" presetID="10" presetClass="entr" presetSubtype="0" fill="hold" nodeType="withEffect">
+                                  <p:stCondLst>
+                                    <p:cond delay="0"/>
+                                  </p:stCondLst>
+                                  <p:childTnLst>
+                                    <p:set>
+                                      <p:cBhvr>
+                                        <p:cTn id="33" dur="1" fill="hold">
+                                          <p:stCondLst>
+                                            <p:cond delay="0"/>
+                                          </p:stCondLst>
+                                        </p:cTn>
+                                        <p:tgtEl>
+                                          <p:spTgt spid="12"/>
+                                        </p:tgtEl>
+                                        <p:attrNameLst>
+                                          <p:attrName>style.visibility</p:attrName>
+                                        </p:attrNameLst>
+                                      </p:cBhvr>
+                                      <p:to>
+                                        <p:strVal val="visible"/>
+                                      </p:to>
+                                    </p:set>
+                                    <p:animEffect transition="in" filter="fade">
+                                      <p:cBhvr>
+                                        <p:cTn id="34" dur="500"/>
+                                        <p:tgtEl>
+                                          <p:spTgt spid="12"/>
+                                        </p:tgtEl>
+                                      </p:cBhvr>
+                                    </p:animEffect>
+                                  </p:childTnLst>
+                                </p:cTn>
+                              </p:par>
+                            </p:childTnLst>
+                          </p:cTn>
+                        </p:par>
+                      </p:childTnLst>
+                    </p:cTn>
+                  </p:par>
+                  <p:par>
+                    <p:cTn id="35" fill="hold">
+                      <p:stCondLst>
+                        <p:cond delay="indefinite"/>
+                      </p:stCondLst>
+                      <p:childTnLst>
+                        <p:par>
+                          <p:cTn id="36" fill="hold">
+                            <p:stCondLst>
+                              <p:cond delay="0"/>
+                            </p:stCondLst>
+                            <p:childTnLst>
+                              <p:par>
+                                <p:cTn id="37" presetID="10" presetClass="entr" presetSubtype="0" fill="hold" grpId="0" nodeType="clickEffect">
+                                  <p:stCondLst>
+                                    <p:cond delay="0"/>
+                                  </p:stCondLst>
+                                  <p:childTnLst>
+                                    <p:set>
+                                      <p:cBhvr>
+                                        <p:cTn id="38" dur="1" fill="hold">
+                                          <p:stCondLst>
+                                            <p:cond delay="0"/>
+                                          </p:stCondLst>
+                                        </p:cTn>
+                                        <p:tgtEl>
+                                          <p:spTgt spid="3">
+                                            <p:txEl>
+                                              <p:pRg st="4" end="4"/>
+                                            </p:txEl>
+                                          </p:spTgt>
+                                        </p:tgtEl>
+                                        <p:attrNameLst>
+                                          <p:attrName>style.visibility</p:attrName>
+                                        </p:attrNameLst>
+                                      </p:cBhvr>
+                                      <p:to>
+                                        <p:strVal val="visible"/>
+                                      </p:to>
+                                    </p:set>
+                                    <p:animEffect transition="in" filter="fade">
+                                      <p:cBhvr>
+                                        <p:cTn id="39" dur="500"/>
+                                        <p:tgtEl>
+                                          <p:spTgt spid="3">
+                                            <p:txEl>
+                                              <p:pRg st="4" end="4"/>
+                                            </p:txEl>
+                                          </p:spTgt>
+                                        </p:tgtEl>
+                                      </p:cBhvr>
+                                    </p:animEffect>
+                                  </p:childTnLst>
+                                </p:cTn>
+                              </p:par>
+                              <p:par>
+                                <p:cTn id="40" presetID="10" presetClass="entr" presetSubtype="0" fill="hold" nodeType="withEffect">
+                                  <p:stCondLst>
+                                    <p:cond delay="0"/>
+                                  </p:stCondLst>
+                                  <p:childTnLst>
+                                    <p:set>
+                                      <p:cBhvr>
+                                        <p:cTn id="41" dur="1" fill="hold">
+                                          <p:stCondLst>
+                                            <p:cond delay="0"/>
+                                          </p:stCondLst>
+                                        </p:cTn>
+                                        <p:tgtEl>
+                                          <p:spTgt spid="14"/>
+                                        </p:tgtEl>
+                                        <p:attrNameLst>
+                                          <p:attrName>style.visibility</p:attrName>
+                                        </p:attrNameLst>
+                                      </p:cBhvr>
+                                      <p:to>
+                                        <p:strVal val="visible"/>
+                                      </p:to>
+                                    </p:set>
+                                    <p:animEffect transition="in" filter="fade">
+                                      <p:cBhvr>
+                                        <p:cTn id="42" dur="500"/>
+                                        <p:tgtEl>
+                                          <p:spTgt spid="14"/>
+                                        </p:tgtEl>
+                                      </p:cBhvr>
+                                    </p:animEffect>
+                                  </p:childTnLst>
+                                </p:cTn>
+                              </p:par>
+                            </p:childTnLst>
+                          </p:cTn>
+                        </p:par>
+                      </p:childTnLst>
+                    </p:cTn>
+                  </p:par>
+                  <p:par>
+                    <p:cTn id="43" fill="hold">
+                      <p:stCondLst>
+                        <p:cond delay="indefinite"/>
+                      </p:stCondLst>
+                      <p:childTnLst>
+                        <p:par>
+                          <p:cTn id="44" fill="hold">
+                            <p:stCondLst>
+                              <p:cond delay="0"/>
+                            </p:stCondLst>
+                            <p:childTnLst>
+                              <p:par>
+                                <p:cTn id="45" presetID="10" presetClass="entr" presetSubtype="0" fill="hold" grpId="0" nodeType="clickEffect">
+                                  <p:stCondLst>
+                                    <p:cond delay="0"/>
+                                  </p:stCondLst>
+                                  <p:childTnLst>
+                                    <p:set>
+                                      <p:cBhvr>
+                                        <p:cTn id="46" dur="1" fill="hold">
+                                          <p:stCondLst>
+                                            <p:cond delay="0"/>
+                                          </p:stCondLst>
+                                        </p:cTn>
+                                        <p:tgtEl>
+                                          <p:spTgt spid="3">
+                                            <p:txEl>
+                                              <p:pRg st="5" end="5"/>
+                                            </p:txEl>
+                                          </p:spTgt>
+                                        </p:tgtEl>
+                                        <p:attrNameLst>
+                                          <p:attrName>style.visibility</p:attrName>
+                                        </p:attrNameLst>
+                                      </p:cBhvr>
+                                      <p:to>
+                                        <p:strVal val="visible"/>
+                                      </p:to>
+                                    </p:set>
+                                    <p:animEffect transition="in" filter="fade">
+                                      <p:cBhvr>
+                                        <p:cTn id="47" dur="500"/>
+                                        <p:tgtEl>
+                                          <p:spTgt spid="3">
+                                            <p:txEl>
+                                              <p:pRg st="5" end="5"/>
+                                            </p:txEl>
+                                          </p:spTgt>
+                                        </p:tgtEl>
+                                      </p:cBhvr>
+                                    </p:animEffect>
+                                  </p:childTnLst>
+                                </p:cTn>
+                              </p:par>
+                              <p:par>
+                                <p:cTn id="48" presetID="10" presetClass="entr" presetSubtype="0" fill="hold" nodeType="withEffect">
+                                  <p:stCondLst>
+                                    <p:cond delay="0"/>
+                                  </p:stCondLst>
+                                  <p:childTnLst>
+                                    <p:set>
+                                      <p:cBhvr>
+                                        <p:cTn id="49" dur="1" fill="hold">
+                                          <p:stCondLst>
+                                            <p:cond delay="0"/>
+                                          </p:stCondLst>
+                                        </p:cTn>
+                                        <p:tgtEl>
+                                          <p:spTgt spid="18"/>
+                                        </p:tgtEl>
+                                        <p:attrNameLst>
+                                          <p:attrName>style.visibility</p:attrName>
+                                        </p:attrNameLst>
+                                      </p:cBhvr>
+                                      <p:to>
+                                        <p:strVal val="visible"/>
+                                      </p:to>
+                                    </p:set>
+                                    <p:animEffect transition="in" filter="fade">
+                                      <p:cBhvr>
+                                        <p:cTn id="50" dur="500"/>
+                                        <p:tgtEl>
+                                          <p:spTgt spid="18"/>
+                                        </p:tgtEl>
+                                      </p:cBhvr>
+                                    </p:animEffect>
+                                  </p:childTnLst>
+                                </p:cTn>
+                              </p:par>
+                            </p:childTnLst>
+                          </p:cTn>
+                        </p:par>
+                      </p:childTnLst>
+                    </p:cTn>
+                  </p:par>
+                  <p:par>
+                    <p:cTn id="51" fill="hold">
+                      <p:stCondLst>
+                        <p:cond delay="indefinite"/>
+                      </p:stCondLst>
+                      <p:childTnLst>
+                        <p:par>
+                          <p:cTn id="52" fill="hold">
+                            <p:stCondLst>
+                              <p:cond delay="0"/>
+                            </p:stCondLst>
+                            <p:childTnLst>
+                              <p:par>
+                                <p:cTn id="53" presetID="10" presetClass="entr" presetSubtype="0" fill="hold" grpId="0" nodeType="clickEffect">
+                                  <p:stCondLst>
+                                    <p:cond delay="0"/>
+                                  </p:stCondLst>
+                                  <p:childTnLst>
+                                    <p:set>
+                                      <p:cBhvr>
+                                        <p:cTn id="54" dur="1" fill="hold">
+                                          <p:stCondLst>
+                                            <p:cond delay="0"/>
+                                          </p:stCondLst>
+                                        </p:cTn>
+                                        <p:tgtEl>
+                                          <p:spTgt spid="3">
+                                            <p:txEl>
+                                              <p:pRg st="6" end="6"/>
+                                            </p:txEl>
+                                          </p:spTgt>
+                                        </p:tgtEl>
+                                        <p:attrNameLst>
+                                          <p:attrName>style.visibility</p:attrName>
+                                        </p:attrNameLst>
+                                      </p:cBhvr>
+                                      <p:to>
+                                        <p:strVal val="visible"/>
+                                      </p:to>
+                                    </p:set>
+                                    <p:animEffect transition="in" filter="fade">
+                                      <p:cBhvr>
+                                        <p:cTn id="55" dur="500"/>
+                                        <p:tgtEl>
+                                          <p:spTgt spid="3">
+                                            <p:txEl>
+                                              <p:pRg st="6" end="6"/>
+                                            </p:txEl>
+                                          </p:spTgt>
+                                        </p:tgtEl>
+                                      </p:cBhvr>
+                                    </p:animEffect>
+                                  </p:childTnLst>
+                                </p:cTn>
+                              </p:par>
+                              <p:par>
+                                <p:cTn id="56" presetID="10" presetClass="entr" presetSubtype="0" fill="hold" nodeType="withEffect">
+                                  <p:stCondLst>
+                                    <p:cond delay="0"/>
+                                  </p:stCondLst>
+                                  <p:childTnLst>
+                                    <p:set>
+                                      <p:cBhvr>
+                                        <p:cTn id="57" dur="1" fill="hold">
+                                          <p:stCondLst>
+                                            <p:cond delay="0"/>
+                                          </p:stCondLst>
+                                        </p:cTn>
+                                        <p:tgtEl>
+                                          <p:spTgt spid="16"/>
+                                        </p:tgtEl>
+                                        <p:attrNameLst>
+                                          <p:attrName>style.visibility</p:attrName>
+                                        </p:attrNameLst>
+                                      </p:cBhvr>
+                                      <p:to>
+                                        <p:strVal val="visible"/>
+                                      </p:to>
+                                    </p:set>
+                                    <p:animEffect transition="in" filter="fade">
+                                      <p:cBhvr>
+                                        <p:cTn id="58" dur="500"/>
+                                        <p:tgtEl>
+                                          <p:spTgt spid="16"/>
+                                        </p:tgtEl>
+                                      </p:cBhvr>
+                                    </p:animEffect>
+                                  </p:childTnLst>
+                                </p:cTn>
+                              </p:par>
+                            </p:childTnLst>
+                          </p:cTn>
+                        </p:par>
+                      </p:childTnLst>
+                    </p:cTn>
+                  </p:par>
+                  <p:par>
+                    <p:cTn id="59" fill="hold">
+                      <p:stCondLst>
+                        <p:cond delay="indefinite"/>
+                      </p:stCondLst>
+                      <p:childTnLst>
+                        <p:par>
+                          <p:cTn id="60" fill="hold">
+                            <p:stCondLst>
+                              <p:cond delay="0"/>
+                            </p:stCondLst>
+                            <p:childTnLst>
+                              <p:par>
+                                <p:cTn id="61" presetID="10" presetClass="entr" presetSubtype="0" fill="hold" grpId="0" nodeType="clickEffect">
+                                  <p:stCondLst>
+                                    <p:cond delay="0"/>
+                                  </p:stCondLst>
+                                  <p:childTnLst>
+                                    <p:set>
+                                      <p:cBhvr>
+                                        <p:cTn id="62" dur="1" fill="hold">
+                                          <p:stCondLst>
+                                            <p:cond delay="0"/>
+                                          </p:stCondLst>
+                                        </p:cTn>
+                                        <p:tgtEl>
+                                          <p:spTgt spid="3">
+                                            <p:txEl>
+                                              <p:pRg st="7" end="7"/>
+                                            </p:txEl>
+                                          </p:spTgt>
+                                        </p:tgtEl>
+                                        <p:attrNameLst>
+                                          <p:attrName>style.visibility</p:attrName>
+                                        </p:attrNameLst>
+                                      </p:cBhvr>
+                                      <p:to>
+                                        <p:strVal val="visible"/>
+                                      </p:to>
+                                    </p:set>
+                                    <p:animEffect transition="in" filter="fade">
+                                      <p:cBhvr>
+                                        <p:cTn id="63" dur="500"/>
+                                        <p:tgtEl>
+                                          <p:spTgt spid="3">
+                                            <p:txEl>
+                                              <p:pRg st="7" end="7"/>
+                                            </p:txEl>
+                                          </p:spTgt>
+                                        </p:tgtEl>
+                                      </p:cBhvr>
+                                    </p:animEffect>
+                                  </p:childTnLst>
+                                </p:cTn>
+                              </p:par>
+                              <p:par>
+                                <p:cTn id="64" presetID="10" presetClass="entr" presetSubtype="0" fill="hold" nodeType="withEffect">
+                                  <p:stCondLst>
+                                    <p:cond delay="0"/>
+                                  </p:stCondLst>
+                                  <p:childTnLst>
+                                    <p:set>
+                                      <p:cBhvr>
+                                        <p:cTn id="65" dur="1" fill="hold">
+                                          <p:stCondLst>
+                                            <p:cond delay="0"/>
+                                          </p:stCondLst>
+                                        </p:cTn>
+                                        <p:tgtEl>
+                                          <p:spTgt spid="20"/>
+                                        </p:tgtEl>
+                                        <p:attrNameLst>
+                                          <p:attrName>style.visibility</p:attrName>
+                                        </p:attrNameLst>
+                                      </p:cBhvr>
+                                      <p:to>
+                                        <p:strVal val="visible"/>
+                                      </p:to>
+                                    </p:set>
+                                    <p:animEffect transition="in" filter="fade">
+                                      <p:cBhvr>
+                                        <p:cTn id="66" dur="500"/>
+                                        <p:tgtEl>
+                                          <p:spTgt spid="20"/>
                                         </p:tgtEl>
                                       </p:cBhvr>
                                     </p:animEffect>
@@ -4779,11 +6224,428 @@
         </p:cTn>
       </p:par>
     </p:tnLst>
+    <p:bldLst>
+      <p:bldP spid="3" grpId="0" uiExpand="1" build="p"/>
+    </p:bldLst>
   </p:timing>
 </p:sld>
 </file>
 
 <file path=ppt/slides/slide5.xml><?xml version="1.0" encoding="utf-8"?>
+<p:sld xmlns:a="http://schemas.openxmlformats.org/drawingml/2006/main" xmlns:r="http://schemas.openxmlformats.org/officeDocument/2006/relationships" xmlns:p="http://schemas.openxmlformats.org/presentationml/2006/main">
+  <p:cSld>
+    <p:bg>
+      <p:bgPr>
+        <a:solidFill>
+          <a:schemeClr val="bg1"/>
+        </a:solidFill>
+        <a:effectLst/>
+      </p:bgPr>
+    </p:bg>
+    <p:spTree>
+      <p:nvGrpSpPr>
+        <p:cNvPr id="1" name=""/>
+        <p:cNvGrpSpPr/>
+        <p:nvPr/>
+      </p:nvGrpSpPr>
+      <p:grpSpPr>
+        <a:xfrm>
+          <a:off x="0" y="0"/>
+          <a:ext cx="0" cy="0"/>
+          <a:chOff x="0" y="0"/>
+          <a:chExt cx="0" cy="0"/>
+        </a:xfrm>
+      </p:grpSpPr>
+      <p:sp>
+        <p:nvSpPr>
+          <p:cNvPr id="10" name="Rectangle 9">
+            <a:extLst>
+              <a:ext uri="{FF2B5EF4-FFF2-40B4-BE49-F238E27FC236}">
+                <a16:creationId xmlns:a16="http://schemas.microsoft.com/office/drawing/2014/main" id="{21FFDA05-9640-4040-B33E-D46FD04434DB}"/>
+              </a:ext>
+              <a:ext uri="{C183D7F6-B498-43B3-948B-1728B52AA6E4}">
+                <adec:decorative xmlns:adec="http://schemas.microsoft.com/office/drawing/2017/decorative" val="1"/>
+              </a:ext>
+            </a:extLst>
+          </p:cNvPr>
+          <p:cNvSpPr>
+            <a:spLocks noGrp="1" noRot="1" noChangeAspect="1" noMove="1" noResize="1" noEditPoints="1" noAdjustHandles="1" noChangeArrowheads="1" noChangeShapeType="1" noTextEdit="1"/>
+          </p:cNvSpPr>
+          <p:nvPr>
+            <p:extLst>
+              <p:ext uri="{386F3935-93C4-4BCD-93E2-E3B085C9AB24}">
+                <p16:designElem xmlns:p16="http://schemas.microsoft.com/office/powerpoint/2015/main" val="1"/>
+              </p:ext>
+            </p:extLst>
+          </p:nvPr>
+        </p:nvSpPr>
+        <p:spPr>
+          <a:xfrm>
+            <a:off x="11292840" y="0"/>
+            <a:ext cx="914400" cy="6858000"/>
+          </a:xfrm>
+          <a:prstGeom prst="rect">
+            <a:avLst/>
+          </a:prstGeom>
+          <a:solidFill>
+            <a:schemeClr val="tx2">
+              <a:lumMod val="75000"/>
+            </a:schemeClr>
+          </a:solidFill>
+          <a:ln>
+            <a:noFill/>
+          </a:ln>
+        </p:spPr>
+        <p:style>
+          <a:lnRef idx="2">
+            <a:schemeClr val="accent1">
+              <a:shade val="50000"/>
+            </a:schemeClr>
+          </a:lnRef>
+          <a:fillRef idx="1">
+            <a:schemeClr val="accent1"/>
+          </a:fillRef>
+          <a:effectRef idx="0">
+            <a:schemeClr val="accent1"/>
+          </a:effectRef>
+          <a:fontRef idx="minor">
+            <a:schemeClr val="lt1"/>
+          </a:fontRef>
+        </p:style>
+      </p:sp>
+      <p:pic>
+        <p:nvPicPr>
+          <p:cNvPr id="7" name="Image 3">
+            <a:extLst>
+              <a:ext uri="{FF2B5EF4-FFF2-40B4-BE49-F238E27FC236}">
+                <a16:creationId xmlns:a16="http://schemas.microsoft.com/office/drawing/2014/main" id="{9AA89735-6D0A-4F09-9207-ABE34C1D1877}"/>
+              </a:ext>
+            </a:extLst>
+          </p:cNvPr>
+          <p:cNvPicPr>
+            <a:picLocks noGrp="1" noChangeAspect="1"/>
+          </p:cNvPicPr>
+          <p:nvPr>
+            <p:ph idx="1"/>
+          </p:nvPr>
+        </p:nvPicPr>
+        <p:blipFill rotWithShape="1">
+          <a:blip r:embed="rId2"/>
+          <a:srcRect b="125"/>
+          <a:stretch/>
+        </p:blipFill>
+        <p:spPr>
+          <a:xfrm>
+            <a:off x="20" y="10"/>
+            <a:ext cx="12207220" cy="6857990"/>
+          </a:xfrm>
+          <a:prstGeom prst="rect">
+            <a:avLst/>
+          </a:prstGeom>
+        </p:spPr>
+      </p:pic>
+    </p:spTree>
+    <p:extLst>
+      <p:ext uri="{BB962C8B-B14F-4D97-AF65-F5344CB8AC3E}">
+        <p14:creationId xmlns:p14="http://schemas.microsoft.com/office/powerpoint/2010/main" val="1749390879"/>
+      </p:ext>
+    </p:extLst>
+  </p:cSld>
+  <p:clrMapOvr>
+    <a:masterClrMapping/>
+  </p:clrMapOvr>
+  <mc:AlternateContent xmlns:mc="http://schemas.openxmlformats.org/markup-compatibility/2006">
+    <mc:Choice xmlns:p14="http://schemas.microsoft.com/office/powerpoint/2010/main" Requires="p14">
+      <p:transition spd="med" p14:dur="700">
+        <p:fade/>
+      </p:transition>
+    </mc:Choice>
+    <mc:Fallback>
+      <p:transition spd="med">
+        <p:fade/>
+      </p:transition>
+    </mc:Fallback>
+  </mc:AlternateContent>
+</p:sld>
+</file>
+
+<file path=ppt/slides/slide6.xml><?xml version="1.0" encoding="utf-8"?>
+<p:sld xmlns:a="http://schemas.openxmlformats.org/drawingml/2006/main" xmlns:r="http://schemas.openxmlformats.org/officeDocument/2006/relationships" xmlns:p="http://schemas.openxmlformats.org/presentationml/2006/main">
+  <p:cSld>
+    <p:bg>
+      <p:bgPr>
+        <a:solidFill>
+          <a:schemeClr val="bg1"/>
+        </a:solidFill>
+        <a:effectLst/>
+      </p:bgPr>
+    </p:bg>
+    <p:spTree>
+      <p:nvGrpSpPr>
+        <p:cNvPr id="1" name=""/>
+        <p:cNvGrpSpPr/>
+        <p:nvPr/>
+      </p:nvGrpSpPr>
+      <p:grpSpPr>
+        <a:xfrm>
+          <a:off x="0" y="0"/>
+          <a:ext cx="0" cy="0"/>
+          <a:chOff x="0" y="0"/>
+          <a:chExt cx="0" cy="0"/>
+        </a:xfrm>
+      </p:grpSpPr>
+      <p:sp>
+        <p:nvSpPr>
+          <p:cNvPr id="10" name="Rectangle 9">
+            <a:extLst>
+              <a:ext uri="{FF2B5EF4-FFF2-40B4-BE49-F238E27FC236}">
+                <a16:creationId xmlns:a16="http://schemas.microsoft.com/office/drawing/2014/main" id="{21FFDA05-9640-4040-B33E-D46FD04434DB}"/>
+              </a:ext>
+              <a:ext uri="{C183D7F6-B498-43B3-948B-1728B52AA6E4}">
+                <adec:decorative xmlns:adec="http://schemas.microsoft.com/office/drawing/2017/decorative" val="1"/>
+              </a:ext>
+            </a:extLst>
+          </p:cNvPr>
+          <p:cNvSpPr>
+            <a:spLocks noGrp="1" noRot="1" noChangeAspect="1" noMove="1" noResize="1" noEditPoints="1" noAdjustHandles="1" noChangeArrowheads="1" noChangeShapeType="1" noTextEdit="1"/>
+          </p:cNvSpPr>
+          <p:nvPr>
+            <p:extLst>
+              <p:ext uri="{386F3935-93C4-4BCD-93E2-E3B085C9AB24}">
+                <p16:designElem xmlns:p16="http://schemas.microsoft.com/office/powerpoint/2015/main" val="1"/>
+              </p:ext>
+            </p:extLst>
+          </p:nvPr>
+        </p:nvSpPr>
+        <p:spPr>
+          <a:xfrm>
+            <a:off x="11292840" y="0"/>
+            <a:ext cx="914400" cy="6858000"/>
+          </a:xfrm>
+          <a:prstGeom prst="rect">
+            <a:avLst/>
+          </a:prstGeom>
+          <a:solidFill>
+            <a:schemeClr val="tx2">
+              <a:lumMod val="75000"/>
+            </a:schemeClr>
+          </a:solidFill>
+          <a:ln>
+            <a:noFill/>
+          </a:ln>
+        </p:spPr>
+        <p:style>
+          <a:lnRef idx="2">
+            <a:schemeClr val="accent1">
+              <a:shade val="50000"/>
+            </a:schemeClr>
+          </a:lnRef>
+          <a:fillRef idx="1">
+            <a:schemeClr val="accent1"/>
+          </a:fillRef>
+          <a:effectRef idx="0">
+            <a:schemeClr val="accent1"/>
+          </a:effectRef>
+          <a:fontRef idx="minor">
+            <a:schemeClr val="lt1"/>
+          </a:fontRef>
+        </p:style>
+      </p:sp>
+      <p:pic>
+        <p:nvPicPr>
+          <p:cNvPr id="7" name="Image 3" descr="Une image contenant texte, carte, intérieur&#10;&#10;Description générée avec un niveau de confiance très élevé">
+            <a:extLst>
+              <a:ext uri="{FF2B5EF4-FFF2-40B4-BE49-F238E27FC236}">
+                <a16:creationId xmlns:a16="http://schemas.microsoft.com/office/drawing/2014/main" id="{1E541F90-1170-4A3C-AC55-FB041A94A149}"/>
+              </a:ext>
+            </a:extLst>
+          </p:cNvPr>
+          <p:cNvPicPr>
+            <a:picLocks noGrp="1" noChangeAspect="1"/>
+          </p:cNvPicPr>
+          <p:nvPr>
+            <p:ph idx="1"/>
+          </p:nvPr>
+        </p:nvPicPr>
+        <p:blipFill rotWithShape="1">
+          <a:blip r:embed="rId2"/>
+          <a:srcRect b="125"/>
+          <a:stretch/>
+        </p:blipFill>
+        <p:spPr>
+          <a:xfrm>
+            <a:off x="20" y="10"/>
+            <a:ext cx="12207220" cy="6857990"/>
+          </a:xfrm>
+          <a:prstGeom prst="rect">
+            <a:avLst/>
+          </a:prstGeom>
+        </p:spPr>
+      </p:pic>
+    </p:spTree>
+    <p:extLst>
+      <p:ext uri="{BB962C8B-B14F-4D97-AF65-F5344CB8AC3E}">
+        <p14:creationId xmlns:p14="http://schemas.microsoft.com/office/powerpoint/2010/main" val="1305572707"/>
+      </p:ext>
+    </p:extLst>
+  </p:cSld>
+  <p:clrMapOvr>
+    <a:masterClrMapping/>
+  </p:clrMapOvr>
+  <mc:AlternateContent xmlns:mc="http://schemas.openxmlformats.org/markup-compatibility/2006">
+    <mc:Choice xmlns:p14="http://schemas.microsoft.com/office/powerpoint/2010/main" Requires="p14">
+      <p:transition spd="med" p14:dur="700">
+        <p:fade/>
+      </p:transition>
+    </mc:Choice>
+    <mc:Fallback>
+      <p:transition spd="med">
+        <p:fade/>
+      </p:transition>
+    </mc:Fallback>
+  </mc:AlternateContent>
+</p:sld>
+</file>
+
+<file path=ppt/slides/slide7.xml><?xml version="1.0" encoding="utf-8"?>
+<p:sld xmlns:a="http://schemas.openxmlformats.org/drawingml/2006/main" xmlns:r="http://schemas.openxmlformats.org/officeDocument/2006/relationships" xmlns:p="http://schemas.openxmlformats.org/presentationml/2006/main">
+  <p:cSld>
+    <p:bg>
+      <p:bgPr>
+        <a:solidFill>
+          <a:schemeClr val="bg1"/>
+        </a:solidFill>
+        <a:effectLst/>
+      </p:bgPr>
+    </p:bg>
+    <p:spTree>
+      <p:nvGrpSpPr>
+        <p:cNvPr id="1" name=""/>
+        <p:cNvGrpSpPr/>
+        <p:nvPr/>
+      </p:nvGrpSpPr>
+      <p:grpSpPr>
+        <a:xfrm>
+          <a:off x="0" y="0"/>
+          <a:ext cx="0" cy="0"/>
+          <a:chOff x="0" y="0"/>
+          <a:chExt cx="0" cy="0"/>
+        </a:xfrm>
+      </p:grpSpPr>
+      <p:sp>
+        <p:nvSpPr>
+          <p:cNvPr id="10" name="Rectangle 9">
+            <a:extLst>
+              <a:ext uri="{FF2B5EF4-FFF2-40B4-BE49-F238E27FC236}">
+                <a16:creationId xmlns:a16="http://schemas.microsoft.com/office/drawing/2014/main" id="{21FFDA05-9640-4040-B33E-D46FD04434DB}"/>
+              </a:ext>
+              <a:ext uri="{C183D7F6-B498-43B3-948B-1728B52AA6E4}">
+                <adec:decorative xmlns:adec="http://schemas.microsoft.com/office/drawing/2017/decorative" val="1"/>
+              </a:ext>
+            </a:extLst>
+          </p:cNvPr>
+          <p:cNvSpPr>
+            <a:spLocks noGrp="1" noRot="1" noChangeAspect="1" noMove="1" noResize="1" noEditPoints="1" noAdjustHandles="1" noChangeArrowheads="1" noChangeShapeType="1" noTextEdit="1"/>
+          </p:cNvSpPr>
+          <p:nvPr>
+            <p:extLst>
+              <p:ext uri="{386F3935-93C4-4BCD-93E2-E3B085C9AB24}">
+                <p16:designElem xmlns:p16="http://schemas.microsoft.com/office/powerpoint/2015/main" val="1"/>
+              </p:ext>
+            </p:extLst>
+          </p:nvPr>
+        </p:nvSpPr>
+        <p:spPr>
+          <a:xfrm>
+            <a:off x="11292840" y="0"/>
+            <a:ext cx="914400" cy="6858000"/>
+          </a:xfrm>
+          <a:prstGeom prst="rect">
+            <a:avLst/>
+          </a:prstGeom>
+          <a:solidFill>
+            <a:schemeClr val="tx2">
+              <a:lumMod val="75000"/>
+            </a:schemeClr>
+          </a:solidFill>
+          <a:ln>
+            <a:noFill/>
+          </a:ln>
+        </p:spPr>
+        <p:style>
+          <a:lnRef idx="2">
+            <a:schemeClr val="accent1">
+              <a:shade val="50000"/>
+            </a:schemeClr>
+          </a:lnRef>
+          <a:fillRef idx="1">
+            <a:schemeClr val="accent1"/>
+          </a:fillRef>
+          <a:effectRef idx="0">
+            <a:schemeClr val="accent1"/>
+          </a:effectRef>
+          <a:fontRef idx="minor">
+            <a:schemeClr val="lt1"/>
+          </a:fontRef>
+        </p:style>
+      </p:sp>
+      <p:pic>
+        <p:nvPicPr>
+          <p:cNvPr id="7" name="Image 3" descr="Une image contenant texte, carte&#10;&#10;Description générée avec un niveau de confiance très élevé">
+            <a:extLst>
+              <a:ext uri="{FF2B5EF4-FFF2-40B4-BE49-F238E27FC236}">
+                <a16:creationId xmlns:a16="http://schemas.microsoft.com/office/drawing/2014/main" id="{ABDECED6-E9B1-47B1-8D25-BEA47166F375}"/>
+              </a:ext>
+            </a:extLst>
+          </p:cNvPr>
+          <p:cNvPicPr>
+            <a:picLocks noGrp="1" noChangeAspect="1"/>
+          </p:cNvPicPr>
+          <p:nvPr>
+            <p:ph idx="1"/>
+          </p:nvPr>
+        </p:nvPicPr>
+        <p:blipFill rotWithShape="1">
+          <a:blip r:embed="rId2"/>
+          <a:srcRect b="125"/>
+          <a:stretch/>
+        </p:blipFill>
+        <p:spPr>
+          <a:xfrm>
+            <a:off x="20" y="10"/>
+            <a:ext cx="12207220" cy="6857990"/>
+          </a:xfrm>
+          <a:prstGeom prst="rect">
+            <a:avLst/>
+          </a:prstGeom>
+        </p:spPr>
+      </p:pic>
+    </p:spTree>
+    <p:extLst>
+      <p:ext uri="{BB962C8B-B14F-4D97-AF65-F5344CB8AC3E}">
+        <p14:creationId xmlns:p14="http://schemas.microsoft.com/office/powerpoint/2010/main" val="3040575299"/>
+      </p:ext>
+    </p:extLst>
+  </p:cSld>
+  <p:clrMapOvr>
+    <a:masterClrMapping/>
+  </p:clrMapOvr>
+  <mc:AlternateContent xmlns:mc="http://schemas.openxmlformats.org/markup-compatibility/2006">
+    <mc:Choice xmlns:p14="http://schemas.microsoft.com/office/powerpoint/2010/main" Requires="p14">
+      <p:transition spd="med" p14:dur="700">
+        <p:fade/>
+      </p:transition>
+    </mc:Choice>
+    <mc:Fallback>
+      <p:transition spd="med">
+        <p:fade/>
+      </p:transition>
+    </mc:Fallback>
+  </mc:AlternateContent>
+</p:sld>
+</file>
+
+<file path=ppt/slides/slide8.xml><?xml version="1.0" encoding="utf-8"?>
 <p:sld xmlns:a="http://schemas.openxmlformats.org/drawingml/2006/main" xmlns:r="http://schemas.openxmlformats.org/officeDocument/2006/relationships" xmlns:p="http://schemas.openxmlformats.org/presentationml/2006/main">
   <p:cSld>
     <p:spTree>
@@ -4802,10 +6664,10 @@
       </p:grpSpPr>
       <p:sp>
         <p:nvSpPr>
-          <p:cNvPr id="5" name="Titre 4">
+          <p:cNvPr id="2" name="Titre 1">
             <a:extLst>
               <a:ext uri="{FF2B5EF4-FFF2-40B4-BE49-F238E27FC236}">
-                <a16:creationId xmlns:a16="http://schemas.microsoft.com/office/drawing/2014/main" id="{58B40DD6-3715-4AA7-BF84-8AA03980C63A}"/>
+                <a16:creationId xmlns:a16="http://schemas.microsoft.com/office/drawing/2014/main" id="{28669A2E-BD89-4BED-A75E-6593E7A33A22}"/>
               </a:ext>
             </a:extLst>
           </p:cNvPr>
@@ -4823,17 +6685,17 @@
           <a:p>
             <a:r>
               <a:rPr lang="fr-FR" dirty="0"/>
-              <a:t>Ce qu’il nous reste à faire</a:t>
+              <a:t>Afficher BUS</a:t>
             </a:r>
           </a:p>
         </p:txBody>
       </p:sp>
       <p:sp>
         <p:nvSpPr>
-          <p:cNvPr id="6" name="Espace réservé du contenu 5">
+          <p:cNvPr id="3" name="Espace réservé du contenu 2">
             <a:extLst>
               <a:ext uri="{FF2B5EF4-FFF2-40B4-BE49-F238E27FC236}">
-                <a16:creationId xmlns:a16="http://schemas.microsoft.com/office/drawing/2014/main" id="{E9DFC205-5B86-4F1D-9C21-D583B5C8FBA3}"/>
+                <a16:creationId xmlns:a16="http://schemas.microsoft.com/office/drawing/2014/main" id="{A9B9A8B2-7A15-4A19-B64B-A7A8938423BA}"/>
               </a:ext>
             </a:extLst>
           </p:cNvPr>
@@ -4846,68 +6708,210 @@
         </p:nvSpPr>
         <p:spPr/>
         <p:txBody>
-          <a:bodyPr>
-            <a:normAutofit/>
-          </a:bodyPr>
+          <a:bodyPr/>
           <a:lstStyle/>
           <a:p>
-            <a:r>
-              <a:rPr lang="fr-FR" sz="2400" dirty="0"/>
-              <a:t>Récupérer les infos du site de Transpole par rapport aux passages de Bus</a:t>
-            </a:r>
-          </a:p>
-          <a:p>
-            <a:r>
-              <a:rPr lang="fr-FR" sz="2400" dirty="0"/>
-              <a:t>Récupérer les infos des stations </a:t>
-            </a:r>
-            <a:r>
-              <a:rPr lang="fr-FR" sz="2400" dirty="0" err="1"/>
-              <a:t>Vlille</a:t>
-            </a:r>
-            <a:r>
-              <a:rPr lang="fr-FR" sz="2400"/>
-              <a:t>/SNCF</a:t>
-            </a:r>
-            <a:endParaRPr lang="fr-FR" sz="2400" dirty="0"/>
-          </a:p>
-          <a:p>
-            <a:r>
-              <a:rPr lang="fr-FR" sz="2400" dirty="0"/>
-              <a:t>Finir les fiches d’informations de certains points d’intérêts</a:t>
-            </a:r>
-          </a:p>
-          <a:p>
-            <a:r>
-              <a:rPr lang="fr-FR" sz="2400" dirty="0"/>
-              <a:t>Décalage automatique de la carte lors de l’ouverture du menu</a:t>
-            </a:r>
-          </a:p>
-          <a:p>
-            <a:endParaRPr lang="fr-FR" sz="2400" dirty="0"/>
-          </a:p>
-          <a:p>
-            <a:endParaRPr lang="fr-FR" sz="2400" dirty="0"/>
+            <a:endParaRPr lang="fr-FR"/>
           </a:p>
         </p:txBody>
       </p:sp>
     </p:spTree>
     <p:extLst>
       <p:ext uri="{BB962C8B-B14F-4D97-AF65-F5344CB8AC3E}">
-        <p14:creationId xmlns:p14="http://schemas.microsoft.com/office/powerpoint/2010/main" val="1995525766"/>
+        <p14:creationId xmlns:p14="http://schemas.microsoft.com/office/powerpoint/2010/main" val="4027215909"/>
       </p:ext>
     </p:extLst>
   </p:cSld>
   <p:clrMapOvr>
     <a:masterClrMapping/>
   </p:clrMapOvr>
-  <mc:AlternateContent xmlns:mc="http://schemas.openxmlformats.org/markup-compatibility/2006" xmlns:p14="http://schemas.microsoft.com/office/powerpoint/2010/main">
-    <mc:Choice Requires="p14">
+  <mc:AlternateContent xmlns:mc="http://schemas.openxmlformats.org/markup-compatibility/2006">
+    <mc:Choice xmlns:p14="http://schemas.microsoft.com/office/powerpoint/2010/main" Requires="p14">
       <p:transition spd="med" p14:dur="700">
         <p:fade/>
       </p:transition>
     </mc:Choice>
-    <mc:Fallback xmlns="">
+    <mc:Fallback>
+      <p:transition spd="med">
+        <p:fade/>
+      </p:transition>
+    </mc:Fallback>
+  </mc:AlternateContent>
+</p:sld>
+</file>
+
+<file path=ppt/slides/slide9.xml><?xml version="1.0" encoding="utf-8"?>
+<p:sld xmlns:a="http://schemas.openxmlformats.org/drawingml/2006/main" xmlns:r="http://schemas.openxmlformats.org/officeDocument/2006/relationships" xmlns:p="http://schemas.openxmlformats.org/presentationml/2006/main">
+  <p:cSld>
+    <p:spTree>
+      <p:nvGrpSpPr>
+        <p:cNvPr id="1" name=""/>
+        <p:cNvGrpSpPr/>
+        <p:nvPr/>
+      </p:nvGrpSpPr>
+      <p:grpSpPr>
+        <a:xfrm>
+          <a:off x="0" y="0"/>
+          <a:ext cx="0" cy="0"/>
+          <a:chOff x="0" y="0"/>
+          <a:chExt cx="0" cy="0"/>
+        </a:xfrm>
+      </p:grpSpPr>
+      <p:sp>
+        <p:nvSpPr>
+          <p:cNvPr id="2" name="Titre 1">
+            <a:extLst>
+              <a:ext uri="{FF2B5EF4-FFF2-40B4-BE49-F238E27FC236}">
+                <a16:creationId xmlns:a16="http://schemas.microsoft.com/office/drawing/2014/main" id="{5F6E156C-7B77-4679-B376-D831DACA7378}"/>
+              </a:ext>
+            </a:extLst>
+          </p:cNvPr>
+          <p:cNvSpPr>
+            <a:spLocks noGrp="1"/>
+          </p:cNvSpPr>
+          <p:nvPr>
+            <p:ph type="title"/>
+          </p:nvPr>
+        </p:nvSpPr>
+        <p:spPr/>
+        <p:txBody>
+          <a:bodyPr/>
+          <a:lstStyle/>
+          <a:p>
+            <a:r>
+              <a:rPr lang="fr-FR" dirty="0"/>
+              <a:t>Notre méthode Agile</a:t>
+            </a:r>
+          </a:p>
+        </p:txBody>
+      </p:sp>
+      <p:sp>
+        <p:nvSpPr>
+          <p:cNvPr id="3" name="Espace réservé du contenu 2">
+            <a:extLst>
+              <a:ext uri="{FF2B5EF4-FFF2-40B4-BE49-F238E27FC236}">
+                <a16:creationId xmlns:a16="http://schemas.microsoft.com/office/drawing/2014/main" id="{DDA2F927-5E08-4036-BBE0-88F08EE3FBA8}"/>
+              </a:ext>
+            </a:extLst>
+          </p:cNvPr>
+          <p:cNvSpPr>
+            <a:spLocks noGrp="1"/>
+          </p:cNvSpPr>
+          <p:nvPr>
+            <p:ph idx="1"/>
+          </p:nvPr>
+        </p:nvSpPr>
+        <p:spPr>
+          <a:xfrm>
+            <a:off x="4176522" y="2282190"/>
+            <a:ext cx="8316270" cy="4210050"/>
+          </a:xfrm>
+        </p:spPr>
+        <p:txBody>
+          <a:bodyPr/>
+          <a:lstStyle/>
+          <a:p>
+            <a:r>
+              <a:rPr lang="fr-FR" dirty="0"/>
+              <a:t>Interactions avec les membres de l'équipe (formation îlot)</a:t>
+            </a:r>
+          </a:p>
+          <a:p>
+            <a:r>
+              <a:rPr lang="fr-FR" dirty="0"/>
+              <a:t>Application concrète sur le plan après chaque idée</a:t>
+            </a:r>
+          </a:p>
+          <a:p>
+            <a:r>
+              <a:rPr lang="fr-FR" dirty="0"/>
+              <a:t>Tests réguliers sur l'écran</a:t>
+            </a:r>
+          </a:p>
+          <a:p>
+            <a:r>
+              <a:rPr lang="fr-FR" dirty="0"/>
+              <a:t>Démonstrations régulières au client</a:t>
+            </a:r>
+          </a:p>
+          <a:p>
+            <a:r>
+              <a:rPr lang="fr-FR" dirty="0"/>
+              <a:t>Ecoute attentive des remarques pour modifications</a:t>
+            </a:r>
+          </a:p>
+          <a:p>
+            <a:r>
+              <a:rPr lang="fr-FR" dirty="0"/>
+              <a:t>Acceptation des changements</a:t>
+            </a:r>
+          </a:p>
+        </p:txBody>
+      </p:sp>
+      <p:pic>
+        <p:nvPicPr>
+          <p:cNvPr id="2050" name="Picture 2" descr="https://scontent-cdg2-1.xx.fbcdn.net/v/t1.15752-9/50755831_1038601626341892_7795486094597816320_n.jpg?_nc_cat=103&amp;_nc_ht=scontent-cdg2-1.xx&amp;oh=df4ba4854318eaf3e70ca7bb4b624b1f&amp;oe=5CB65D8F">
+            <a:extLst>
+              <a:ext uri="{FF2B5EF4-FFF2-40B4-BE49-F238E27FC236}">
+                <a16:creationId xmlns:a16="http://schemas.microsoft.com/office/drawing/2014/main" id="{9A32F534-FD32-461B-B93A-6B7D394EA428}"/>
+              </a:ext>
+            </a:extLst>
+          </p:cNvPr>
+          <p:cNvPicPr>
+            <a:picLocks noChangeAspect="1" noChangeArrowheads="1"/>
+          </p:cNvPicPr>
+          <p:nvPr/>
+        </p:nvPicPr>
+        <p:blipFill>
+          <a:blip r:embed="rId2">
+            <a:extLst>
+              <a:ext uri="{28A0092B-C50C-407E-A947-70E740481C1C}">
+                <a14:useLocalDpi xmlns:a14="http://schemas.microsoft.com/office/drawing/2010/main" val="0"/>
+              </a:ext>
+            </a:extLst>
+          </a:blip>
+          <a:srcRect/>
+          <a:stretch>
+            <a:fillRect/>
+          </a:stretch>
+        </p:blipFill>
+        <p:spPr bwMode="auto">
+          <a:xfrm>
+            <a:off x="409574" y="2095500"/>
+            <a:ext cx="3297555" cy="4396740"/>
+          </a:xfrm>
+          <a:prstGeom prst="rect">
+            <a:avLst/>
+          </a:prstGeom>
+          <a:noFill/>
+          <a:extLst>
+            <a:ext uri="{909E8E84-426E-40DD-AFC4-6F175D3DCCD1}">
+              <a14:hiddenFill xmlns:a14="http://schemas.microsoft.com/office/drawing/2010/main">
+                <a:solidFill>
+                  <a:srgbClr val="FFFFFF"/>
+                </a:solidFill>
+              </a14:hiddenFill>
+            </a:ext>
+          </a:extLst>
+        </p:spPr>
+      </p:pic>
+    </p:spTree>
+    <p:extLst>
+      <p:ext uri="{BB962C8B-B14F-4D97-AF65-F5344CB8AC3E}">
+        <p14:creationId xmlns:p14="http://schemas.microsoft.com/office/powerpoint/2010/main" val="1858645902"/>
+      </p:ext>
+    </p:extLst>
+  </p:cSld>
+  <p:clrMapOvr>
+    <a:masterClrMapping/>
+  </p:clrMapOvr>
+  <mc:AlternateContent xmlns:mc="http://schemas.openxmlformats.org/markup-compatibility/2006">
+    <mc:Choice xmlns:p14="http://schemas.microsoft.com/office/powerpoint/2010/main" Requires="p14">
+      <p:transition spd="med" p14:dur="700">
+        <p:fade/>
+      </p:transition>
+    </mc:Choice>
+    <mc:Fallback>
       <p:transition spd="med">
         <p:fade/>
       </p:transition>
@@ -4947,7 +6951,7 @@
                                           </p:stCondLst>
                                         </p:cTn>
                                         <p:tgtEl>
-                                          <p:spTgt spid="6">
+                                          <p:spTgt spid="3">
                                             <p:txEl>
                                               <p:pRg st="0" end="0"/>
                                             </p:txEl>
@@ -4965,11 +6969,46 @@
                                       <p:cBhvr>
                                         <p:cTn id="7" dur="500"/>
                                         <p:tgtEl>
-                                          <p:spTgt spid="6">
+                                          <p:spTgt spid="3">
                                             <p:txEl>
                                               <p:pRg st="0" end="0"/>
                                             </p:txEl>
                                           </p:spTgt>
+                                        </p:tgtEl>
+                                      </p:cBhvr>
+                                    </p:animEffect>
+                                  </p:childTnLst>
+                                </p:cTn>
+                              </p:par>
+                              <p:par>
+                                <p:cTn id="8" presetID="10" presetClass="entr" presetSubtype="0" fill="hold" nodeType="withEffect">
+                                  <p:stCondLst>
+                                    <p:cond delay="0"/>
+                                  </p:stCondLst>
+                                  <p:childTnLst>
+                                    <p:set>
+                                      <p:cBhvr>
+                                        <p:cTn id="9" dur="1" fill="hold">
+                                          <p:stCondLst>
+                                            <p:cond delay="0"/>
+                                          </p:stCondLst>
+                                        </p:cTn>
+                                        <p:tgtEl>
+                                          <p:spTgt spid="2050"/>
+                                        </p:tgtEl>
+                                        <p:attrNameLst>
+                                          <p:attrName>style.visibility</p:attrName>
+                                        </p:attrNameLst>
+                                      </p:cBhvr>
+                                      <p:to>
+                                        <p:strVal val="visible"/>
+                                      </p:to>
+                                    </p:set>
+                                    <p:animEffect transition="in" filter="fade">
+                                      <p:cBhvr>
+                                        <p:cTn id="10" dur="500"/>
+                                        <p:tgtEl>
+                                          <p:spTgt spid="2050"/>
                                         </p:tgtEl>
                                       </p:cBhvr>
                                     </p:animEffect>
@@ -4983,32 +7022,32 @@
                     </p:cTn>
                   </p:par>
                   <p:par>
-                    <p:cTn id="8" fill="hold">
+                    <p:cTn id="11" fill="hold">
                       <p:stCondLst>
                         <p:cond delay="indefinite"/>
                       </p:stCondLst>
                       <p:childTnLst>
                         <p:par>
-                          <p:cTn id="9" fill="hold">
+                          <p:cTn id="12" fill="hold">
                             <p:stCondLst>
                               <p:cond delay="0"/>
                             </p:stCondLst>
                             <p:childTnLst>
                               <p:par>
-                                <p:cTn id="10" presetID="10" presetClass="entr" presetSubtype="0" fill="hold" grpId="0" nodeType="clickEffect">
+                                <p:cTn id="13" presetID="10" presetClass="entr" presetSubtype="0" fill="hold" grpId="0" nodeType="clickEffect">
                                   <p:stCondLst>
                                     <p:cond delay="0"/>
                                   </p:stCondLst>
                                   <p:childTnLst>
                                     <p:set>
                                       <p:cBhvr>
-                                        <p:cTn id="11" dur="1" fill="hold">
+                                        <p:cTn id="14" dur="1" fill="hold">
                                           <p:stCondLst>
                                             <p:cond delay="0"/>
                                           </p:stCondLst>
                                         </p:cTn>
                                         <p:tgtEl>
-                                          <p:spTgt spid="6">
+                                          <p:spTgt spid="3">
                                             <p:txEl>
                                               <p:pRg st="1" end="1"/>
                                             </p:txEl>
@@ -5024,9 +7063,9 @@
                                     </p:set>
                                     <p:animEffect transition="in" filter="fade">
                                       <p:cBhvr>
-                                        <p:cTn id="12" dur="500"/>
+                                        <p:cTn id="15" dur="500"/>
                                         <p:tgtEl>
-                                          <p:spTgt spid="6">
+                                          <p:spTgt spid="3">
                                             <p:txEl>
                                               <p:pRg st="1" end="1"/>
                                             </p:txEl>
@@ -5044,32 +7083,32 @@
                     </p:cTn>
                   </p:par>
                   <p:par>
-                    <p:cTn id="13" fill="hold">
+                    <p:cTn id="16" fill="hold">
                       <p:stCondLst>
                         <p:cond delay="indefinite"/>
                       </p:stCondLst>
                       <p:childTnLst>
                         <p:par>
-                          <p:cTn id="14" fill="hold">
+                          <p:cTn id="17" fill="hold">
                             <p:stCondLst>
                               <p:cond delay="0"/>
                             </p:stCondLst>
                             <p:childTnLst>
                               <p:par>
-                                <p:cTn id="15" presetID="10" presetClass="entr" presetSubtype="0" fill="hold" grpId="0" nodeType="clickEffect">
+                                <p:cTn id="18" presetID="10" presetClass="entr" presetSubtype="0" fill="hold" grpId="0" nodeType="clickEffect">
                                   <p:stCondLst>
                                     <p:cond delay="0"/>
                                   </p:stCondLst>
                                   <p:childTnLst>
                                     <p:set>
                                       <p:cBhvr>
-                                        <p:cTn id="16" dur="1" fill="hold">
+                                        <p:cTn id="19" dur="1" fill="hold">
                                           <p:stCondLst>
                                             <p:cond delay="0"/>
                                           </p:stCondLst>
                                         </p:cTn>
                                         <p:tgtEl>
-                                          <p:spTgt spid="6">
+                                          <p:spTgt spid="3">
                                             <p:txEl>
                                               <p:pRg st="2" end="2"/>
                                             </p:txEl>
@@ -5085,9 +7124,9 @@
                                     </p:set>
                                     <p:animEffect transition="in" filter="fade">
                                       <p:cBhvr>
-                                        <p:cTn id="17" dur="500"/>
+                                        <p:cTn id="20" dur="500"/>
                                         <p:tgtEl>
-                                          <p:spTgt spid="6">
+                                          <p:spTgt spid="3">
                                             <p:txEl>
                                               <p:pRg st="2" end="2"/>
                                             </p:txEl>
@@ -5105,32 +7144,32 @@
                     </p:cTn>
                   </p:par>
                   <p:par>
-                    <p:cTn id="18" fill="hold">
+                    <p:cTn id="21" fill="hold">
                       <p:stCondLst>
                         <p:cond delay="indefinite"/>
                       </p:stCondLst>
                       <p:childTnLst>
                         <p:par>
-                          <p:cTn id="19" fill="hold">
+                          <p:cTn id="22" fill="hold">
                             <p:stCondLst>
                               <p:cond delay="0"/>
                             </p:stCondLst>
                             <p:childTnLst>
                               <p:par>
-                                <p:cTn id="20" presetID="10" presetClass="entr" presetSubtype="0" fill="hold" grpId="0" nodeType="clickEffect">
+                                <p:cTn id="23" presetID="10" presetClass="entr" presetSubtype="0" fill="hold" grpId="0" nodeType="clickEffect">
                                   <p:stCondLst>
                                     <p:cond delay="0"/>
                                   </p:stCondLst>
                                   <p:childTnLst>
                                     <p:set>
                                       <p:cBhvr>
-                                        <p:cTn id="21" dur="1" fill="hold">
+                                        <p:cTn id="24" dur="1" fill="hold">
                                           <p:stCondLst>
                                             <p:cond delay="0"/>
                                           </p:stCondLst>
                                         </p:cTn>
                                         <p:tgtEl>
-                                          <p:spTgt spid="6">
+                                          <p:spTgt spid="3">
                                             <p:txEl>
                                               <p:pRg st="3" end="3"/>
                                             </p:txEl>
@@ -5146,11 +7185,133 @@
                                     </p:set>
                                     <p:animEffect transition="in" filter="fade">
                                       <p:cBhvr>
-                                        <p:cTn id="22" dur="500"/>
+                                        <p:cTn id="25" dur="500"/>
                                         <p:tgtEl>
-                                          <p:spTgt spid="6">
+                                          <p:spTgt spid="3">
                                             <p:txEl>
                                               <p:pRg st="3" end="3"/>
+                                            </p:txEl>
+                                          </p:spTgt>
+                                        </p:tgtEl>
+                                      </p:cBhvr>
+                                    </p:animEffect>
+                                  </p:childTnLst>
+                                </p:cTn>
+                              </p:par>
+                            </p:childTnLst>
+                          </p:cTn>
+                        </p:par>
+                      </p:childTnLst>
+                    </p:cTn>
+                  </p:par>
+                  <p:par>
+                    <p:cTn id="26" fill="hold">
+                      <p:stCondLst>
+                        <p:cond delay="indefinite"/>
+                      </p:stCondLst>
+                      <p:childTnLst>
+                        <p:par>
+                          <p:cTn id="27" fill="hold">
+                            <p:stCondLst>
+                              <p:cond delay="0"/>
+                            </p:stCondLst>
+                            <p:childTnLst>
+                              <p:par>
+                                <p:cTn id="28" presetID="10" presetClass="entr" presetSubtype="0" fill="hold" grpId="0" nodeType="clickEffect">
+                                  <p:stCondLst>
+                                    <p:cond delay="0"/>
+                                  </p:stCondLst>
+                                  <p:childTnLst>
+                                    <p:set>
+                                      <p:cBhvr>
+                                        <p:cTn id="29" dur="1" fill="hold">
+                                          <p:stCondLst>
+                                            <p:cond delay="0"/>
+                                          </p:stCondLst>
+                                        </p:cTn>
+                                        <p:tgtEl>
+                                          <p:spTgt spid="3">
+                                            <p:txEl>
+                                              <p:pRg st="4" end="4"/>
+                                            </p:txEl>
+                                          </p:spTgt>
+                                        </p:tgtEl>
+                                        <p:attrNameLst>
+                                          <p:attrName>style.visibility</p:attrName>
+                                        </p:attrNameLst>
+                                      </p:cBhvr>
+                                      <p:to>
+                                        <p:strVal val="visible"/>
+                                      </p:to>
+                                    </p:set>
+                                    <p:animEffect transition="in" filter="fade">
+                                      <p:cBhvr>
+                                        <p:cTn id="30" dur="500"/>
+                                        <p:tgtEl>
+                                          <p:spTgt spid="3">
+                                            <p:txEl>
+                                              <p:pRg st="4" end="4"/>
+                                            </p:txEl>
+                                          </p:spTgt>
+                                        </p:tgtEl>
+                                      </p:cBhvr>
+                                    </p:animEffect>
+                                  </p:childTnLst>
+                                </p:cTn>
+                              </p:par>
+                            </p:childTnLst>
+                          </p:cTn>
+                        </p:par>
+                      </p:childTnLst>
+                    </p:cTn>
+                  </p:par>
+                  <p:par>
+                    <p:cTn id="31" fill="hold">
+                      <p:stCondLst>
+                        <p:cond delay="indefinite"/>
+                      </p:stCondLst>
+                      <p:childTnLst>
+                        <p:par>
+                          <p:cTn id="32" fill="hold">
+                            <p:stCondLst>
+                              <p:cond delay="0"/>
+                            </p:stCondLst>
+                            <p:childTnLst>
+                              <p:par>
+                                <p:cTn id="33" presetID="10" presetClass="entr" presetSubtype="0" fill="hold" grpId="0" nodeType="clickEffect">
+                                  <p:stCondLst>
+                                    <p:cond delay="0"/>
+                                  </p:stCondLst>
+                                  <p:childTnLst>
+                                    <p:set>
+                                      <p:cBhvr>
+                                        <p:cTn id="34" dur="1" fill="hold">
+                                          <p:stCondLst>
+                                            <p:cond delay="0"/>
+                                          </p:stCondLst>
+                                        </p:cTn>
+                                        <p:tgtEl>
+                                          <p:spTgt spid="3">
+                                            <p:txEl>
+                                              <p:pRg st="5" end="5"/>
+                                            </p:txEl>
+                                          </p:spTgt>
+                                        </p:tgtEl>
+                                        <p:attrNameLst>
+                                          <p:attrName>style.visibility</p:attrName>
+                                        </p:attrNameLst>
+                                      </p:cBhvr>
+                                      <p:to>
+                                        <p:strVal val="visible"/>
+                                      </p:to>
+                                    </p:set>
+                                    <p:animEffect transition="in" filter="fade">
+                                      <p:cBhvr>
+                                        <p:cTn id="35" dur="500"/>
+                                        <p:tgtEl>
+                                          <p:spTgt spid="3">
+                                            <p:txEl>
+                                              <p:pRg st="5" end="5"/>
                                             </p:txEl>
                                           </p:spTgt>
                                         </p:tgtEl>
@@ -5187,7 +7348,7 @@
       </p:par>
     </p:tnLst>
     <p:bldLst>
-      <p:bldP spid="6" grpId="0" build="p"/>
+      <p:bldP spid="3" grpId="0" uiExpand="1" build="p"/>
     </p:bldLst>
   </p:timing>
 </p:sld>
@@ -5196,42 +7357,42 @@
 <file path=ppt/theme/theme1.xml><?xml version="1.0" encoding="utf-8"?>
 <a:theme xmlns:a="http://schemas.openxmlformats.org/drawingml/2006/main" name="Affichage">
   <a:themeElements>
-    <a:clrScheme name="Affichage">
+    <a:clrScheme name="Bleu II">
       <a:dk1>
-        <a:srgbClr val="000000"/>
+        <a:sysClr val="windowText" lastClr="000000"/>
       </a:dk1>
       <a:lt1>
-        <a:srgbClr val="FFFFFF"/>
+        <a:sysClr val="window" lastClr="FFFFFF"/>
       </a:lt1>
       <a:dk2>
-        <a:srgbClr val="46464A"/>
+        <a:srgbClr val="335B74"/>
       </a:dk2>
       <a:lt2>
-        <a:srgbClr val="D6D3CC"/>
+        <a:srgbClr val="DFE3E5"/>
       </a:lt2>
       <a:accent1>
-        <a:srgbClr val="6F6F74"/>
+        <a:srgbClr val="1CADE4"/>
       </a:accent1>
       <a:accent2>
-        <a:srgbClr val="92A9B9"/>
+        <a:srgbClr val="2683C6"/>
       </a:accent2>
       <a:accent3>
-        <a:srgbClr val="A7B789"/>
+        <a:srgbClr val="27CED7"/>
       </a:accent3>
       <a:accent4>
-        <a:srgbClr val="B9A489"/>
+        <a:srgbClr val="42BA97"/>
       </a:accent4>
       <a:accent5>
-        <a:srgbClr val="8D6374"/>
+        <a:srgbClr val="3E8853"/>
       </a:accent5>
       <a:accent6>
-        <a:srgbClr val="9B7362"/>
+        <a:srgbClr val="62A39F"/>
       </a:accent6>
       <a:hlink>
-        <a:srgbClr val="67AABF"/>
+        <a:srgbClr val="6EAC1C"/>
       </a:hlink>
       <a:folHlink>
-        <a:srgbClr val="ABAFA5"/>
+        <a:srgbClr val="B26B02"/>
       </a:folHlink>
     </a:clrScheme>
     <a:fontScheme name="Affichage">
@@ -5444,4 +7605,18 @@
     </a:ext>
   </a:extLst>
 </a:theme>
+</file>
+
+<file path=customXml/item1.xml><?xml version="1.0" encoding="utf-8"?>
+<Control xmlns="http://schemas.microsoft.com/VisualStudio/2011/storyboarding/control">
+  <Id Name="System.Storyboarding.Icons.Edit" Revision="1" Stencil="System.Storyboarding.Icons" StencilVersion="0.1"/>
+</Control>
+</file>
+
+<file path=customXml/itemProps1.xml><?xml version="1.0" encoding="utf-8"?>
+<ds:datastoreItem xmlns:ds="http://schemas.openxmlformats.org/officeDocument/2006/customXml" ds:itemID="{35260E95-65F0-421F-95ED-E36E10DE1F67}">
+  <ds:schemaRefs>
+    <ds:schemaRef ds:uri="http://schemas.microsoft.com/VisualStudio/2011/storyboarding/control"/>
+  </ds:schemaRefs>
+</ds:datastoreItem>
 </file>
</xml_diff>